<commit_message>
Update dev guide 1
</commit_message>
<xml_diff>
--- a/doc/DeveloperGuide.pptx
+++ b/doc/DeveloperGuide.pptx
@@ -9,8 +9,9 @@
     <p:sldId id="259" r:id="rId3"/>
     <p:sldId id="260" r:id="rId4"/>
     <p:sldId id="261" r:id="rId5"/>
-    <p:sldId id="258" r:id="rId6"/>
-    <p:sldId id="256" r:id="rId7"/>
+    <p:sldId id="262" r:id="rId6"/>
+    <p:sldId id="258" r:id="rId7"/>
+    <p:sldId id="256" r:id="rId8"/>
   </p:sldIdLst>
   <p:sldSz cx="12192000" cy="6858000"/>
   <p:notesSz cx="6858000" cy="9144000"/>
@@ -111,7 +112,7 @@
   </p:defaultTextStyle>
   <p:extLst>
     <p:ext uri="{EFAFB233-063F-42B5-8137-9DF3F51BA10A}">
-      <p15:sldGuideLst xmlns="" xmlns:p15="http://schemas.microsoft.com/office/powerpoint/2012/main"/>
+      <p15:sldGuideLst xmlns:p15="http://schemas.microsoft.com/office/powerpoint/2012/main" xmlns=""/>
     </p:ext>
   </p:extLst>
 </p:presentation>
@@ -249,7 +250,7 @@
             <a:fld id="{6A6D87FE-50F0-4561-88DF-C9C624F56716}" type="datetimeFigureOut">
               <a:rPr lang="en-SG" smtClean="0"/>
               <a:pPr/>
-              <a:t>18/10/2016</a:t>
+              <a:t>27/10/2016</a:t>
             </a:fld>
             <a:endParaRPr lang="en-SG"/>
           </a:p>
@@ -301,7 +302,7 @@
     </p:spTree>
     <p:extLst>
       <p:ext uri="{BB962C8B-B14F-4D97-AF65-F5344CB8AC3E}">
-        <p14:creationId xmlns="" xmlns:p14="http://schemas.microsoft.com/office/powerpoint/2010/main" val="885967701"/>
+        <p14:creationId xmlns:p14="http://schemas.microsoft.com/office/powerpoint/2010/main" xmlns="" val="885967701"/>
       </p:ext>
     </p:extLst>
   </p:cSld>
@@ -421,7 +422,7 @@
             <a:fld id="{6A6D87FE-50F0-4561-88DF-C9C624F56716}" type="datetimeFigureOut">
               <a:rPr lang="en-SG" smtClean="0"/>
               <a:pPr/>
-              <a:t>18/10/2016</a:t>
+              <a:t>27/10/2016</a:t>
             </a:fld>
             <a:endParaRPr lang="en-SG"/>
           </a:p>
@@ -473,7 +474,7 @@
     </p:spTree>
     <p:extLst>
       <p:ext uri="{BB962C8B-B14F-4D97-AF65-F5344CB8AC3E}">
-        <p14:creationId xmlns="" xmlns:p14="http://schemas.microsoft.com/office/powerpoint/2010/main" val="2514989070"/>
+        <p14:creationId xmlns:p14="http://schemas.microsoft.com/office/powerpoint/2010/main" xmlns="" val="2514989070"/>
       </p:ext>
     </p:extLst>
   </p:cSld>
@@ -603,7 +604,7 @@
             <a:fld id="{6A6D87FE-50F0-4561-88DF-C9C624F56716}" type="datetimeFigureOut">
               <a:rPr lang="en-SG" smtClean="0"/>
               <a:pPr/>
-              <a:t>18/10/2016</a:t>
+              <a:t>27/10/2016</a:t>
             </a:fld>
             <a:endParaRPr lang="en-SG"/>
           </a:p>
@@ -655,7 +656,7 @@
     </p:spTree>
     <p:extLst>
       <p:ext uri="{BB962C8B-B14F-4D97-AF65-F5344CB8AC3E}">
-        <p14:creationId xmlns="" xmlns:p14="http://schemas.microsoft.com/office/powerpoint/2010/main" val="1140117352"/>
+        <p14:creationId xmlns:p14="http://schemas.microsoft.com/office/powerpoint/2010/main" xmlns="" val="1140117352"/>
       </p:ext>
     </p:extLst>
   </p:cSld>
@@ -775,7 +776,7 @@
             <a:fld id="{6A6D87FE-50F0-4561-88DF-C9C624F56716}" type="datetimeFigureOut">
               <a:rPr lang="en-SG" smtClean="0"/>
               <a:pPr/>
-              <a:t>18/10/2016</a:t>
+              <a:t>27/10/2016</a:t>
             </a:fld>
             <a:endParaRPr lang="en-SG"/>
           </a:p>
@@ -827,7 +828,7 @@
     </p:spTree>
     <p:extLst>
       <p:ext uri="{BB962C8B-B14F-4D97-AF65-F5344CB8AC3E}">
-        <p14:creationId xmlns="" xmlns:p14="http://schemas.microsoft.com/office/powerpoint/2010/main" val="1305359399"/>
+        <p14:creationId xmlns:p14="http://schemas.microsoft.com/office/powerpoint/2010/main" xmlns="" val="1305359399"/>
       </p:ext>
     </p:extLst>
   </p:cSld>
@@ -1023,7 +1024,7 @@
             <a:fld id="{6A6D87FE-50F0-4561-88DF-C9C624F56716}" type="datetimeFigureOut">
               <a:rPr lang="en-SG" smtClean="0"/>
               <a:pPr/>
-              <a:t>18/10/2016</a:t>
+              <a:t>27/10/2016</a:t>
             </a:fld>
             <a:endParaRPr lang="en-SG"/>
           </a:p>
@@ -1075,7 +1076,7 @@
     </p:spTree>
     <p:extLst>
       <p:ext uri="{BB962C8B-B14F-4D97-AF65-F5344CB8AC3E}">
-        <p14:creationId xmlns="" xmlns:p14="http://schemas.microsoft.com/office/powerpoint/2010/main" val="1635507559"/>
+        <p14:creationId xmlns:p14="http://schemas.microsoft.com/office/powerpoint/2010/main" xmlns="" val="1635507559"/>
       </p:ext>
     </p:extLst>
   </p:cSld>
@@ -1257,7 +1258,7 @@
             <a:fld id="{6A6D87FE-50F0-4561-88DF-C9C624F56716}" type="datetimeFigureOut">
               <a:rPr lang="en-SG" smtClean="0"/>
               <a:pPr/>
-              <a:t>18/10/2016</a:t>
+              <a:t>27/10/2016</a:t>
             </a:fld>
             <a:endParaRPr lang="en-SG"/>
           </a:p>
@@ -1309,7 +1310,7 @@
     </p:spTree>
     <p:extLst>
       <p:ext uri="{BB962C8B-B14F-4D97-AF65-F5344CB8AC3E}">
-        <p14:creationId xmlns="" xmlns:p14="http://schemas.microsoft.com/office/powerpoint/2010/main" val="3880365593"/>
+        <p14:creationId xmlns:p14="http://schemas.microsoft.com/office/powerpoint/2010/main" xmlns="" val="3880365593"/>
       </p:ext>
     </p:extLst>
   </p:cSld>
@@ -1626,7 +1627,7 @@
             <a:fld id="{6A6D87FE-50F0-4561-88DF-C9C624F56716}" type="datetimeFigureOut">
               <a:rPr lang="en-SG" smtClean="0"/>
               <a:pPr/>
-              <a:t>18/10/2016</a:t>
+              <a:t>27/10/2016</a:t>
             </a:fld>
             <a:endParaRPr lang="en-SG"/>
           </a:p>
@@ -1678,7 +1679,7 @@
     </p:spTree>
     <p:extLst>
       <p:ext uri="{BB962C8B-B14F-4D97-AF65-F5344CB8AC3E}">
-        <p14:creationId xmlns="" xmlns:p14="http://schemas.microsoft.com/office/powerpoint/2010/main" val="761753800"/>
+        <p14:creationId xmlns:p14="http://schemas.microsoft.com/office/powerpoint/2010/main" xmlns="" val="761753800"/>
       </p:ext>
     </p:extLst>
   </p:cSld>
@@ -1746,7 +1747,7 @@
             <a:fld id="{6A6D87FE-50F0-4561-88DF-C9C624F56716}" type="datetimeFigureOut">
               <a:rPr lang="en-SG" smtClean="0"/>
               <a:pPr/>
-              <a:t>18/10/2016</a:t>
+              <a:t>27/10/2016</a:t>
             </a:fld>
             <a:endParaRPr lang="en-SG"/>
           </a:p>
@@ -1798,7 +1799,7 @@
     </p:spTree>
     <p:extLst>
       <p:ext uri="{BB962C8B-B14F-4D97-AF65-F5344CB8AC3E}">
-        <p14:creationId xmlns="" xmlns:p14="http://schemas.microsoft.com/office/powerpoint/2010/main" val="442809760"/>
+        <p14:creationId xmlns:p14="http://schemas.microsoft.com/office/powerpoint/2010/main" xmlns="" val="442809760"/>
       </p:ext>
     </p:extLst>
   </p:cSld>
@@ -1843,7 +1844,7 @@
             <a:fld id="{6A6D87FE-50F0-4561-88DF-C9C624F56716}" type="datetimeFigureOut">
               <a:rPr lang="en-SG" smtClean="0"/>
               <a:pPr/>
-              <a:t>18/10/2016</a:t>
+              <a:t>27/10/2016</a:t>
             </a:fld>
             <a:endParaRPr lang="en-SG"/>
           </a:p>
@@ -1895,7 +1896,7 @@
     </p:spTree>
     <p:extLst>
       <p:ext uri="{BB962C8B-B14F-4D97-AF65-F5344CB8AC3E}">
-        <p14:creationId xmlns="" xmlns:p14="http://schemas.microsoft.com/office/powerpoint/2010/main" val="3041616938"/>
+        <p14:creationId xmlns:p14="http://schemas.microsoft.com/office/powerpoint/2010/main" xmlns="" val="3041616938"/>
       </p:ext>
     </p:extLst>
   </p:cSld>
@@ -2122,7 +2123,7 @@
             <a:fld id="{6A6D87FE-50F0-4561-88DF-C9C624F56716}" type="datetimeFigureOut">
               <a:rPr lang="en-SG" smtClean="0"/>
               <a:pPr/>
-              <a:t>18/10/2016</a:t>
+              <a:t>27/10/2016</a:t>
             </a:fld>
             <a:endParaRPr lang="en-SG"/>
           </a:p>
@@ -2174,7 +2175,7 @@
     </p:spTree>
     <p:extLst>
       <p:ext uri="{BB962C8B-B14F-4D97-AF65-F5344CB8AC3E}">
-        <p14:creationId xmlns="" xmlns:p14="http://schemas.microsoft.com/office/powerpoint/2010/main" val="2367210547"/>
+        <p14:creationId xmlns:p14="http://schemas.microsoft.com/office/powerpoint/2010/main" xmlns="" val="2367210547"/>
       </p:ext>
     </p:extLst>
   </p:cSld>
@@ -2377,7 +2378,7 @@
             <a:fld id="{6A6D87FE-50F0-4561-88DF-C9C624F56716}" type="datetimeFigureOut">
               <a:rPr lang="en-SG" smtClean="0"/>
               <a:pPr/>
-              <a:t>18/10/2016</a:t>
+              <a:t>27/10/2016</a:t>
             </a:fld>
             <a:endParaRPr lang="en-SG"/>
           </a:p>
@@ -2429,7 +2430,7 @@
     </p:spTree>
     <p:extLst>
       <p:ext uri="{BB962C8B-B14F-4D97-AF65-F5344CB8AC3E}">
-        <p14:creationId xmlns="" xmlns:p14="http://schemas.microsoft.com/office/powerpoint/2010/main" val="5036302"/>
+        <p14:creationId xmlns:p14="http://schemas.microsoft.com/office/powerpoint/2010/main" xmlns="" val="5036302"/>
       </p:ext>
     </p:extLst>
   </p:cSld>
@@ -2592,7 +2593,7 @@
             <a:fld id="{6A6D87FE-50F0-4561-88DF-C9C624F56716}" type="datetimeFigureOut">
               <a:rPr lang="en-SG" smtClean="0"/>
               <a:pPr/>
-              <a:t>18/10/2016</a:t>
+              <a:t>27/10/2016</a:t>
             </a:fld>
             <a:endParaRPr lang="en-SG"/>
           </a:p>
@@ -2680,7 +2681,7 @@
     </p:spTree>
     <p:extLst>
       <p:ext uri="{BB962C8B-B14F-4D97-AF65-F5344CB8AC3E}">
-        <p14:creationId xmlns="" xmlns:p14="http://schemas.microsoft.com/office/powerpoint/2010/main" val="2495799563"/>
+        <p14:creationId xmlns:p14="http://schemas.microsoft.com/office/powerpoint/2010/main" xmlns="" val="2495799563"/>
       </p:ext>
     </p:extLst>
   </p:cSld>
@@ -3626,7 +3627,7 @@
     </p:spTree>
     <p:extLst>
       <p:ext uri="{BB962C8B-B14F-4D97-AF65-F5344CB8AC3E}">
-        <p14:creationId xmlns="" xmlns:p14="http://schemas.microsoft.com/office/powerpoint/2010/main" val="2395715797"/>
+        <p14:creationId xmlns:p14="http://schemas.microsoft.com/office/powerpoint/2010/main" xmlns="" val="2395715797"/>
       </p:ext>
     </p:extLst>
   </p:cSld>
@@ -4674,7 +4675,7 @@
     </p:spTree>
     <p:extLst>
       <p:ext uri="{BB962C8B-B14F-4D97-AF65-F5344CB8AC3E}">
-        <p14:creationId xmlns="" xmlns:p14="http://schemas.microsoft.com/office/powerpoint/2010/main" val="865566284"/>
+        <p14:creationId xmlns:p14="http://schemas.microsoft.com/office/powerpoint/2010/main" xmlns="" val="865566284"/>
       </p:ext>
     </p:extLst>
   </p:cSld>
@@ -6371,7 +6372,7 @@
     </p:spTree>
     <p:extLst>
       <p:ext uri="{BB962C8B-B14F-4D97-AF65-F5344CB8AC3E}">
-        <p14:creationId xmlns="" xmlns:p14="http://schemas.microsoft.com/office/powerpoint/2010/main" val="144807405"/>
+        <p14:creationId xmlns:p14="http://schemas.microsoft.com/office/powerpoint/2010/main" xmlns="" val="144807405"/>
       </p:ext>
     </p:extLst>
   </p:cSld>
@@ -6437,7 +6438,7 @@
         </p:nvGrpSpPr>
         <p:grpSpPr>
           <a:xfrm>
-            <a:off x="221003" y="605481"/>
+            <a:off x="192128" y="518856"/>
             <a:ext cx="11846594" cy="6153665"/>
             <a:chOff x="221003" y="605481"/>
             <a:chExt cx="11846594" cy="6153665"/>
@@ -6543,13 +6544,26 @@
             <a:p>
               <a:pPr algn="ctr"/>
               <a:r>
-                <a:rPr lang="en-SG" sz="1400" dirty="0">
+                <a:rPr lang="en-SG" sz="1400" dirty="0" err="1" smtClean="0">
                   <a:solidFill>
                     <a:schemeClr val="accent1"/>
                   </a:solidFill>
                 </a:rPr>
-                <a:t>ConsoleController</a:t>
+                <a:t>MainWindow</a:t>
               </a:r>
+              <a:r>
+                <a:rPr lang="en-SG" sz="1400" dirty="0" smtClean="0">
+                  <a:solidFill>
+                    <a:schemeClr val="accent1"/>
+                  </a:solidFill>
+                </a:rPr>
+                <a:t>-Controller</a:t>
+              </a:r>
+              <a:endParaRPr lang="en-SG" sz="1400" dirty="0">
+                <a:solidFill>
+                  <a:schemeClr val="accent1"/>
+                </a:solidFill>
+              </a:endParaRPr>
             </a:p>
           </p:txBody>
         </p:sp>
@@ -6947,7 +6961,7 @@
           </p:nvSpPr>
           <p:spPr>
             <a:xfrm>
-              <a:off x="2409948" y="3526472"/>
+              <a:off x="2388791" y="3526472"/>
               <a:ext cx="1592370" cy="533885"/>
             </a:xfrm>
             <a:prstGeom prst="rect">
@@ -7014,7 +7028,7 @@
           </p:nvSpPr>
           <p:spPr>
             <a:xfrm>
-              <a:off x="2388791" y="4536403"/>
+              <a:off x="2388791" y="4527244"/>
               <a:ext cx="1592370" cy="533885"/>
             </a:xfrm>
             <a:prstGeom prst="rect">
@@ -7071,7 +7085,7 @@
           </p:nvSpPr>
           <p:spPr>
             <a:xfrm>
-              <a:off x="2409948" y="5558691"/>
+              <a:off x="2388791" y="5558691"/>
               <a:ext cx="1592370" cy="533885"/>
             </a:xfrm>
             <a:prstGeom prst="rect">
@@ -7128,7 +7142,7 @@
           </p:nvSpPr>
           <p:spPr>
             <a:xfrm>
-              <a:off x="7009376" y="3960966"/>
+              <a:off x="6903501" y="3152466"/>
               <a:ext cx="1782592" cy="533885"/>
             </a:xfrm>
             <a:prstGeom prst="rect">
@@ -7195,7 +7209,7 @@
           </p:nvSpPr>
           <p:spPr>
             <a:xfrm>
-              <a:off x="7009377" y="2965234"/>
+              <a:off x="6903502" y="2156734"/>
               <a:ext cx="1782591" cy="533885"/>
             </a:xfrm>
             <a:prstGeom prst="rect">
@@ -7252,7 +7266,7 @@
           </p:nvSpPr>
           <p:spPr>
             <a:xfrm>
-              <a:off x="4819636" y="3960966"/>
+              <a:off x="4453886" y="4527244"/>
               <a:ext cx="1592370" cy="533885"/>
             </a:xfrm>
             <a:prstGeom prst="rect">
@@ -7319,7 +7333,7 @@
           </p:nvSpPr>
           <p:spPr>
             <a:xfrm>
-              <a:off x="4815275" y="4770887"/>
+              <a:off x="4449525" y="5309408"/>
               <a:ext cx="1592370" cy="533885"/>
             </a:xfrm>
             <a:prstGeom prst="rect">
@@ -7386,7 +7400,7 @@
           </p:nvSpPr>
           <p:spPr>
             <a:xfrm>
-              <a:off x="4815275" y="5504448"/>
+              <a:off x="4449525" y="6091573"/>
               <a:ext cx="1592370" cy="533885"/>
             </a:xfrm>
             <a:prstGeom prst="rect">
@@ -7453,7 +7467,7 @@
           </p:nvSpPr>
           <p:spPr>
             <a:xfrm>
-              <a:off x="5208225" y="1751427"/>
+              <a:off x="5102350" y="942927"/>
               <a:ext cx="2045986" cy="533885"/>
             </a:xfrm>
             <a:prstGeom prst="rect">
@@ -7520,7 +7534,7 @@
           </p:nvSpPr>
           <p:spPr>
             <a:xfrm>
-              <a:off x="7440746" y="1781329"/>
+              <a:off x="7334871" y="972829"/>
               <a:ext cx="1579686" cy="533885"/>
             </a:xfrm>
             <a:prstGeom prst="rect">
@@ -7581,40 +7595,6 @@
         </p:sp>
         <p:cxnSp>
           <p:nvCxnSpPr>
-            <p:cNvPr id="3" name="Connector: Elbow 2"/>
-            <p:cNvCxnSpPr/>
-            <p:nvPr/>
-          </p:nvCxnSpPr>
-          <p:spPr>
-            <a:xfrm rot="10800000" flipV="1">
-              <a:off x="3981161" y="4287794"/>
-              <a:ext cx="834114" cy="515551"/>
-            </a:xfrm>
-            <a:prstGeom prst="bentConnector3">
-              <a:avLst/>
-            </a:prstGeom>
-            <a:ln>
-              <a:prstDash val="dash"/>
-              <a:tailEnd type="triangle"/>
-            </a:ln>
-          </p:spPr>
-          <p:style>
-            <a:lnRef idx="1">
-              <a:schemeClr val="accent1"/>
-            </a:lnRef>
-            <a:fillRef idx="0">
-              <a:schemeClr val="accent1"/>
-            </a:fillRef>
-            <a:effectRef idx="0">
-              <a:schemeClr val="accent1"/>
-            </a:effectRef>
-            <a:fontRef idx="minor">
-              <a:schemeClr val="tx1"/>
-            </a:fontRef>
-          </p:style>
-        </p:cxnSp>
-        <p:cxnSp>
-          <p:nvCxnSpPr>
             <p:cNvPr id="16" name="Connector: Elbow 15"/>
             <p:cNvCxnSpPr>
               <a:stCxn id="62" idx="1"/>
@@ -7623,13 +7603,11 @@
           </p:nvCxnSpPr>
           <p:spPr>
             <a:xfrm rot="10800000">
-              <a:off x="4398217" y="4770888"/>
-              <a:ext cx="417058" cy="266943"/>
+              <a:off x="4196669" y="4831883"/>
+              <a:ext cx="252857" cy="744469"/>
             </a:xfrm>
-            <a:prstGeom prst="bentConnector3">
-              <a:avLst>
-                <a:gd name="adj1" fmla="val 100368"/>
-              </a:avLst>
+            <a:prstGeom prst="bentConnector2">
+              <a:avLst/>
             </a:prstGeom>
             <a:ln>
               <a:prstDash val="dash"/>
@@ -7660,8 +7638,8 @@
           </p:nvCxnSpPr>
           <p:spPr>
             <a:xfrm rot="10800000">
-              <a:off x="4398217" y="5037829"/>
-              <a:ext cx="417059" cy="733562"/>
+              <a:off x="4196669" y="5563402"/>
+              <a:ext cx="252857" cy="795114"/>
             </a:xfrm>
             <a:prstGeom prst="bentConnector2">
               <a:avLst/>
@@ -7696,7 +7674,7 @@
           </p:nvCxnSpPr>
           <p:spPr>
             <a:xfrm rot="16200000" flipH="1">
-              <a:off x="6725984" y="1790545"/>
+              <a:off x="6620109" y="982045"/>
               <a:ext cx="679922" cy="1669455"/>
             </a:xfrm>
             <a:prstGeom prst="bentConnector3">
@@ -7732,7 +7710,7 @@
           </p:nvCxnSpPr>
           <p:spPr>
             <a:xfrm rot="5400000">
-              <a:off x="7910601" y="2305286"/>
+              <a:off x="7804726" y="1496786"/>
               <a:ext cx="310060" cy="329917"/>
             </a:xfrm>
             <a:prstGeom prst="bentConnector2">
@@ -7845,7 +7823,7 @@
           </p:nvSpPr>
           <p:spPr>
             <a:xfrm>
-              <a:off x="3086248" y="4037493"/>
+              <a:off x="3086248" y="4056743"/>
               <a:ext cx="197456" cy="231649"/>
             </a:xfrm>
             <a:prstGeom prst="diamond">
@@ -7921,15 +7899,15 @@
           <p:nvCxnSpPr>
             <p:cNvPr id="71" name="Straight Arrow Connector 70"/>
             <p:cNvCxnSpPr>
-              <a:stCxn id="67" idx="2"/>
+              <a:stCxn id="67" idx="0"/>
               <a:endCxn id="34" idx="0"/>
             </p:cNvCxnSpPr>
             <p:nvPr/>
           </p:nvCxnSpPr>
           <p:spPr>
             <a:xfrm>
-              <a:off x="3184976" y="2287267"/>
-              <a:ext cx="0" cy="229274"/>
+              <a:off x="3184976" y="2055618"/>
+              <a:ext cx="0" cy="460923"/>
             </a:xfrm>
             <a:prstGeom prst="straightConnector1">
               <a:avLst/>
@@ -7959,13 +7937,16 @@
         <p:cxnSp>
           <p:nvCxnSpPr>
             <p:cNvPr id="72" name="Straight Arrow Connector 71"/>
-            <p:cNvCxnSpPr/>
+            <p:cNvCxnSpPr>
+              <a:stCxn id="68" idx="0"/>
+              <a:endCxn id="35" idx="0"/>
+            </p:cNvCxnSpPr>
             <p:nvPr/>
           </p:nvCxnSpPr>
           <p:spPr>
             <a:xfrm>
-              <a:off x="3189094" y="3304643"/>
-              <a:ext cx="0" cy="229274"/>
+              <a:off x="3184976" y="3067386"/>
+              <a:ext cx="0" cy="459086"/>
             </a:xfrm>
             <a:prstGeom prst="straightConnector1">
               <a:avLst/>
@@ -7995,13 +7976,16 @@
         <p:cxnSp>
           <p:nvCxnSpPr>
             <p:cNvPr id="73" name="Straight Arrow Connector 72"/>
-            <p:cNvCxnSpPr/>
+            <p:cNvCxnSpPr>
+              <a:stCxn id="69" idx="0"/>
+              <a:endCxn id="38" idx="0"/>
+            </p:cNvCxnSpPr>
             <p:nvPr/>
           </p:nvCxnSpPr>
           <p:spPr>
             <a:xfrm>
-              <a:off x="3201451" y="4293186"/>
-              <a:ext cx="0" cy="229274"/>
+              <a:off x="3184976" y="4056743"/>
+              <a:ext cx="0" cy="470501"/>
             </a:xfrm>
             <a:prstGeom prst="straightConnector1">
               <a:avLst/>
@@ -8031,13 +8015,15 @@
         <p:cxnSp>
           <p:nvCxnSpPr>
             <p:cNvPr id="74" name="Straight Arrow Connector 73"/>
-            <p:cNvCxnSpPr/>
+            <p:cNvCxnSpPr>
+              <a:stCxn id="70" idx="0"/>
+            </p:cNvCxnSpPr>
             <p:nvPr/>
           </p:nvCxnSpPr>
           <p:spPr>
-            <a:xfrm>
-              <a:off x="3201452" y="5331157"/>
-              <a:ext cx="0" cy="229274"/>
+            <a:xfrm flipH="1">
+              <a:off x="3201452" y="5092433"/>
+              <a:ext cx="4681" cy="467998"/>
             </a:xfrm>
             <a:prstGeom prst="straightConnector1">
               <a:avLst/>
@@ -8072,7 +8058,7 @@
           </p:nvSpPr>
           <p:spPr>
             <a:xfrm rot="16200000">
-              <a:off x="6452603" y="4112083"/>
+              <a:off x="6057970" y="4699227"/>
               <a:ext cx="197456" cy="231649"/>
             </a:xfrm>
             <a:prstGeom prst="diamond">
@@ -8104,41 +8090,6 @@
             </a:p>
           </p:txBody>
         </p:sp>
-        <p:cxnSp>
-          <p:nvCxnSpPr>
-            <p:cNvPr id="77" name="Straight Arrow Connector 76"/>
-            <p:cNvCxnSpPr>
-              <a:stCxn id="75" idx="0"/>
-            </p:cNvCxnSpPr>
-            <p:nvPr/>
-          </p:nvCxnSpPr>
-          <p:spPr>
-            <a:xfrm flipV="1">
-              <a:off x="6435507" y="4227907"/>
-              <a:ext cx="573869" cy="1"/>
-            </a:xfrm>
-            <a:prstGeom prst="straightConnector1">
-              <a:avLst/>
-            </a:prstGeom>
-            <a:ln>
-              <a:tailEnd type="triangle"/>
-            </a:ln>
-          </p:spPr>
-          <p:style>
-            <a:lnRef idx="1">
-              <a:schemeClr val="accent1"/>
-            </a:lnRef>
-            <a:fillRef idx="0">
-              <a:schemeClr val="accent1"/>
-            </a:fillRef>
-            <a:effectRef idx="0">
-              <a:schemeClr val="accent1"/>
-            </a:effectRef>
-            <a:fontRef idx="minor">
-              <a:schemeClr val="tx1"/>
-            </a:fontRef>
-          </p:style>
-        </p:cxnSp>
         <p:sp>
           <p:nvSpPr>
             <p:cNvPr id="80" name="Diamond 79"/>
@@ -8147,7 +8098,7 @@
           </p:nvSpPr>
           <p:spPr>
             <a:xfrm>
-              <a:off x="7801944" y="3729317"/>
+              <a:off x="7696069" y="2920817"/>
               <a:ext cx="197456" cy="231649"/>
             </a:xfrm>
             <a:prstGeom prst="diamond">
@@ -8187,7 +8138,7 @@
           </p:nvCxnSpPr>
           <p:spPr>
             <a:xfrm>
-              <a:off x="7884672" y="3502353"/>
+              <a:off x="7778797" y="2693853"/>
               <a:ext cx="0" cy="229274"/>
             </a:xfrm>
             <a:prstGeom prst="straightConnector1">
@@ -8217,10 +8168,84 @@
           </p:style>
         </p:cxnSp>
       </p:grpSp>
+      <p:cxnSp>
+        <p:nvCxnSpPr>
+          <p:cNvPr id="44" name="Connector: Elbow 2"/>
+          <p:cNvCxnSpPr>
+            <a:stCxn id="61" idx="1"/>
+            <a:endCxn id="38" idx="3"/>
+          </p:cNvCxnSpPr>
+          <p:nvPr/>
+        </p:nvCxnSpPr>
+        <p:spPr>
+          <a:xfrm rot="10800000">
+            <a:off x="3952287" y="4707562"/>
+            <a:ext cx="472725" cy="12700"/>
+          </a:xfrm>
+          <a:prstGeom prst="bentConnector3">
+            <a:avLst>
+              <a:gd name="adj1" fmla="val 50000"/>
+            </a:avLst>
+          </a:prstGeom>
+          <a:ln>
+            <a:prstDash val="dash"/>
+            <a:tailEnd type="triangle"/>
+          </a:ln>
+        </p:spPr>
+        <p:style>
+          <a:lnRef idx="1">
+            <a:schemeClr val="accent1"/>
+          </a:lnRef>
+          <a:fillRef idx="0">
+            <a:schemeClr val="accent1"/>
+          </a:fillRef>
+          <a:effectRef idx="0">
+            <a:schemeClr val="accent1"/>
+          </a:effectRef>
+          <a:fontRef idx="minor">
+            <a:schemeClr val="tx1"/>
+          </a:fontRef>
+        </p:style>
+      </p:cxnSp>
+      <p:cxnSp>
+        <p:nvCxnSpPr>
+          <p:cNvPr id="97" name="Elbow Connector 96"/>
+          <p:cNvCxnSpPr>
+            <a:endCxn id="50" idx="2"/>
+          </p:cNvCxnSpPr>
+          <p:nvPr/>
+        </p:nvCxnSpPr>
+        <p:spPr>
+          <a:xfrm flipV="1">
+            <a:off x="6017381" y="3599726"/>
+            <a:ext cx="1748541" cy="1136711"/>
+          </a:xfrm>
+          <a:prstGeom prst="bentConnector2">
+            <a:avLst/>
+          </a:prstGeom>
+          <a:ln>
+            <a:tailEnd type="arrow"/>
+          </a:ln>
+        </p:spPr>
+        <p:style>
+          <a:lnRef idx="1">
+            <a:schemeClr val="accent1"/>
+          </a:lnRef>
+          <a:fillRef idx="0">
+            <a:schemeClr val="accent1"/>
+          </a:fillRef>
+          <a:effectRef idx="0">
+            <a:schemeClr val="accent1"/>
+          </a:effectRef>
+          <a:fontRef idx="minor">
+            <a:schemeClr val="tx1"/>
+          </a:fontRef>
+        </p:style>
+      </p:cxnSp>
     </p:spTree>
     <p:extLst>
       <p:ext uri="{BB962C8B-B14F-4D97-AF65-F5344CB8AC3E}">
-        <p14:creationId xmlns="" xmlns:p14="http://schemas.microsoft.com/office/powerpoint/2010/main" val="1577130838"/>
+        <p14:creationId xmlns:p14="http://schemas.microsoft.com/office/powerpoint/2010/main" xmlns="" val="1577130838"/>
       </p:ext>
     </p:extLst>
   </p:cSld>
@@ -8231,6 +8256,1805 @@
 </file>
 
 <file path=ppt/slides/slide5.xml><?xml version="1.0" encoding="utf-8"?>
+<p:sld xmlns:a="http://schemas.openxmlformats.org/drawingml/2006/main" xmlns:r="http://schemas.openxmlformats.org/officeDocument/2006/relationships" xmlns:p="http://schemas.openxmlformats.org/presentationml/2006/main">
+  <p:cSld>
+    <p:spTree>
+      <p:nvGrpSpPr>
+        <p:cNvPr id="1" name=""/>
+        <p:cNvGrpSpPr/>
+        <p:nvPr/>
+      </p:nvGrpSpPr>
+      <p:grpSpPr>
+        <a:xfrm>
+          <a:off x="0" y="0"/>
+          <a:ext cx="0" cy="0"/>
+          <a:chOff x="0" y="0"/>
+          <a:chExt cx="0" cy="0"/>
+        </a:xfrm>
+      </p:grpSpPr>
+      <p:sp>
+        <p:nvSpPr>
+          <p:cNvPr id="4" name="TextBox 3"/>
+          <p:cNvSpPr txBox="1"/>
+          <p:nvPr/>
+        </p:nvSpPr>
+        <p:spPr>
+          <a:xfrm>
+            <a:off x="0" y="0"/>
+            <a:ext cx="3928896" cy="369332"/>
+          </a:xfrm>
+          <a:prstGeom prst="rect">
+            <a:avLst/>
+          </a:prstGeom>
+          <a:noFill/>
+        </p:spPr>
+        <p:txBody>
+          <a:bodyPr wrap="none" rtlCol="0">
+            <a:spAutoFit/>
+          </a:bodyPr>
+          <a:lstStyle/>
+          <a:p>
+            <a:r>
+              <a:rPr lang="en-SG" dirty="0" smtClean="0">
+                <a:latin typeface="Garamond" panose="02020404030301010803" pitchFamily="18" charset="0"/>
+              </a:rPr>
+              <a:t>Sequence Diagram for generic commands</a:t>
+            </a:r>
+            <a:endParaRPr lang="en-SG" dirty="0">
+              <a:latin typeface="Garamond" panose="02020404030301010803" pitchFamily="18" charset="0"/>
+            </a:endParaRPr>
+          </a:p>
+        </p:txBody>
+      </p:sp>
+      <p:grpSp>
+        <p:nvGrpSpPr>
+          <p:cNvPr id="58" name="Group 57"/>
+          <p:cNvGrpSpPr/>
+          <p:nvPr/>
+        </p:nvGrpSpPr>
+        <p:grpSpPr>
+          <a:xfrm>
+            <a:off x="1700911" y="456608"/>
+            <a:ext cx="8790178" cy="5944784"/>
+            <a:chOff x="180567" y="456608"/>
+            <a:chExt cx="8790178" cy="5944784"/>
+          </a:xfrm>
+        </p:grpSpPr>
+        <p:cxnSp>
+          <p:nvCxnSpPr>
+            <p:cNvPr id="53" name="Straight Connector 52"/>
+            <p:cNvCxnSpPr>
+              <a:stCxn id="45" idx="2"/>
+            </p:cNvCxnSpPr>
+            <p:nvPr/>
+          </p:nvCxnSpPr>
+          <p:spPr>
+            <a:xfrm flipH="1">
+              <a:off x="7190519" y="2788768"/>
+              <a:ext cx="6895" cy="1032461"/>
+            </a:xfrm>
+            <a:prstGeom prst="line">
+              <a:avLst/>
+            </a:prstGeom>
+            <a:ln w="19050">
+              <a:solidFill>
+                <a:schemeClr val="tx1"/>
+              </a:solidFill>
+              <a:prstDash val="sysDash"/>
+            </a:ln>
+          </p:spPr>
+          <p:style>
+            <a:lnRef idx="1">
+              <a:schemeClr val="accent1"/>
+            </a:lnRef>
+            <a:fillRef idx="0">
+              <a:schemeClr val="accent1"/>
+            </a:fillRef>
+            <a:effectRef idx="0">
+              <a:schemeClr val="accent1"/>
+            </a:effectRef>
+            <a:fontRef idx="minor">
+              <a:schemeClr val="tx1"/>
+            </a:fontRef>
+          </p:style>
+        </p:cxnSp>
+        <p:grpSp>
+          <p:nvGrpSpPr>
+            <p:cNvPr id="57" name="Group 56"/>
+            <p:cNvGrpSpPr/>
+            <p:nvPr/>
+          </p:nvGrpSpPr>
+          <p:grpSpPr>
+            <a:xfrm>
+              <a:off x="180567" y="456608"/>
+              <a:ext cx="8790178" cy="5944784"/>
+              <a:chOff x="180567" y="717344"/>
+              <a:chExt cx="8790178" cy="5944784"/>
+            </a:xfrm>
+          </p:grpSpPr>
+          <p:sp>
+            <p:nvSpPr>
+              <p:cNvPr id="31" name="TextBox 30"/>
+              <p:cNvSpPr txBox="1"/>
+              <p:nvPr/>
+            </p:nvSpPr>
+            <p:spPr>
+              <a:xfrm>
+                <a:off x="4928145" y="2252316"/>
+                <a:ext cx="4042600" cy="276999"/>
+              </a:xfrm>
+              <a:prstGeom prst="rect">
+                <a:avLst/>
+              </a:prstGeom>
+              <a:noFill/>
+            </p:spPr>
+            <p:txBody>
+              <a:bodyPr wrap="square" rtlCol="0">
+                <a:spAutoFit/>
+              </a:bodyPr>
+              <a:lstStyle/>
+              <a:p>
+                <a:r>
+                  <a:rPr lang="en-SG" sz="1200" dirty="0" smtClean="0"/>
+                  <a:t>[Until first command that respond to </a:t>
+                </a:r>
+                <a:r>
+                  <a:rPr lang="en-SG" sz="1200" dirty="0" err="1" smtClean="0"/>
+                  <a:t>userInput</a:t>
+                </a:r>
+                <a:r>
+                  <a:rPr lang="en-SG" sz="1200" dirty="0" smtClean="0"/>
+                  <a:t>]</a:t>
+                </a:r>
+                <a:endParaRPr lang="en-SG" sz="1200" dirty="0"/>
+              </a:p>
+            </p:txBody>
+          </p:sp>
+          <p:grpSp>
+            <p:nvGrpSpPr>
+              <p:cNvPr id="56" name="Group 55"/>
+              <p:cNvGrpSpPr/>
+              <p:nvPr/>
+            </p:nvGrpSpPr>
+            <p:grpSpPr>
+              <a:xfrm>
+                <a:off x="180567" y="717344"/>
+                <a:ext cx="8135660" cy="5944784"/>
+                <a:chOff x="180567" y="717344"/>
+                <a:chExt cx="8135660" cy="5944784"/>
+              </a:xfrm>
+            </p:grpSpPr>
+            <p:sp>
+              <p:nvSpPr>
+                <p:cNvPr id="43" name="Rectangle 42"/>
+                <p:cNvSpPr/>
+                <p:nvPr/>
+              </p:nvSpPr>
+              <p:spPr>
+                <a:xfrm>
+                  <a:off x="1811275" y="717344"/>
+                  <a:ext cx="1592370" cy="533885"/>
+                </a:xfrm>
+                <a:prstGeom prst="rect">
+                  <a:avLst/>
+                </a:prstGeom>
+                <a:gradFill>
+                  <a:gsLst>
+                    <a:gs pos="29000">
+                      <a:schemeClr val="accent1">
+                        <a:lumMod val="40000"/>
+                        <a:lumOff val="60000"/>
+                      </a:schemeClr>
+                    </a:gs>
+                    <a:gs pos="100000">
+                      <a:schemeClr val="accent1">
+                        <a:lumMod val="20000"/>
+                        <a:lumOff val="80000"/>
+                      </a:schemeClr>
+                    </a:gs>
+                  </a:gsLst>
+                  <a:lin ang="5400000" scaled="1"/>
+                </a:gradFill>
+                <a:ln w="12700">
+                  <a:solidFill>
+                    <a:schemeClr val="accent1"/>
+                  </a:solidFill>
+                </a:ln>
+              </p:spPr>
+              <p:style>
+                <a:lnRef idx="1">
+                  <a:schemeClr val="accent6"/>
+                </a:lnRef>
+                <a:fillRef idx="2">
+                  <a:schemeClr val="accent6"/>
+                </a:fillRef>
+                <a:effectRef idx="1">
+                  <a:schemeClr val="accent6"/>
+                </a:effectRef>
+                <a:fontRef idx="minor">
+                  <a:schemeClr val="dk1"/>
+                </a:fontRef>
+              </p:style>
+              <p:txBody>
+                <a:bodyPr rtlCol="0" anchor="ctr"/>
+                <a:lstStyle/>
+                <a:p>
+                  <a:pPr algn="ctr"/>
+                  <a:r>
+                    <a:rPr lang="en-SG" sz="1400" dirty="0" smtClean="0">
+                      <a:solidFill>
+                        <a:schemeClr val="accent1"/>
+                      </a:solidFill>
+                    </a:rPr>
+                    <a:t>:</a:t>
+                  </a:r>
+                  <a:r>
+                    <a:rPr lang="en-SG" sz="1400" dirty="0" err="1" smtClean="0">
+                      <a:solidFill>
+                        <a:schemeClr val="accent1"/>
+                      </a:solidFill>
+                    </a:rPr>
+                    <a:t>ControlUnit</a:t>
+                  </a:r>
+                  <a:endParaRPr lang="en-SG" sz="1400" dirty="0">
+                    <a:solidFill>
+                      <a:schemeClr val="accent1"/>
+                    </a:solidFill>
+                  </a:endParaRPr>
+                </a:p>
+              </p:txBody>
+            </p:sp>
+            <p:sp>
+              <p:nvSpPr>
+                <p:cNvPr id="44" name="Rectangle 43"/>
+                <p:cNvSpPr/>
+                <p:nvPr/>
+              </p:nvSpPr>
+              <p:spPr>
+                <a:xfrm>
+                  <a:off x="4097429" y="908244"/>
+                  <a:ext cx="1636217" cy="533885"/>
+                </a:xfrm>
+                <a:prstGeom prst="rect">
+                  <a:avLst/>
+                </a:prstGeom>
+                <a:gradFill>
+                  <a:gsLst>
+                    <a:gs pos="29000">
+                      <a:schemeClr val="accent1">
+                        <a:lumMod val="40000"/>
+                        <a:lumOff val="60000"/>
+                      </a:schemeClr>
+                    </a:gs>
+                    <a:gs pos="100000">
+                      <a:schemeClr val="accent1">
+                        <a:lumMod val="20000"/>
+                        <a:lumOff val="80000"/>
+                      </a:schemeClr>
+                    </a:gs>
+                  </a:gsLst>
+                  <a:lin ang="5400000" scaled="1"/>
+                </a:gradFill>
+                <a:ln w="12700">
+                  <a:solidFill>
+                    <a:schemeClr val="accent1"/>
+                  </a:solidFill>
+                </a:ln>
+              </p:spPr>
+              <p:style>
+                <a:lnRef idx="1">
+                  <a:schemeClr val="accent6"/>
+                </a:lnRef>
+                <a:fillRef idx="2">
+                  <a:schemeClr val="accent6"/>
+                </a:fillRef>
+                <a:effectRef idx="1">
+                  <a:schemeClr val="accent6"/>
+                </a:effectRef>
+                <a:fontRef idx="minor">
+                  <a:schemeClr val="dk1"/>
+                </a:fontRef>
+              </p:style>
+              <p:txBody>
+                <a:bodyPr rtlCol="0" anchor="ctr"/>
+                <a:lstStyle/>
+                <a:p>
+                  <a:pPr algn="ctr"/>
+                  <a:r>
+                    <a:rPr lang="en-SG" sz="1400" dirty="0" smtClean="0">
+                      <a:solidFill>
+                        <a:schemeClr val="accent1"/>
+                      </a:solidFill>
+                    </a:rPr>
+                    <a:t>:</a:t>
+                  </a:r>
+                  <a:r>
+                    <a:rPr lang="en-SG" sz="1400" dirty="0" err="1" smtClean="0">
+                      <a:solidFill>
+                        <a:schemeClr val="accent1"/>
+                      </a:solidFill>
+                    </a:rPr>
+                    <a:t>CommandManager</a:t>
+                  </a:r>
+                  <a:endParaRPr lang="en-SG" sz="1400" dirty="0">
+                    <a:solidFill>
+                      <a:schemeClr val="accent1"/>
+                    </a:solidFill>
+                  </a:endParaRPr>
+                </a:p>
+              </p:txBody>
+            </p:sp>
+            <p:sp>
+              <p:nvSpPr>
+                <p:cNvPr id="45" name="Rectangle 44"/>
+                <p:cNvSpPr/>
+                <p:nvPr/>
+              </p:nvSpPr>
+              <p:spPr>
+                <a:xfrm>
+                  <a:off x="6379305" y="2515619"/>
+                  <a:ext cx="1636217" cy="533885"/>
+                </a:xfrm>
+                <a:prstGeom prst="rect">
+                  <a:avLst/>
+                </a:prstGeom>
+                <a:gradFill>
+                  <a:gsLst>
+                    <a:gs pos="29000">
+                      <a:schemeClr val="accent1">
+                        <a:lumMod val="40000"/>
+                        <a:lumOff val="60000"/>
+                      </a:schemeClr>
+                    </a:gs>
+                    <a:gs pos="100000">
+                      <a:schemeClr val="accent1">
+                        <a:lumMod val="20000"/>
+                        <a:lumOff val="80000"/>
+                      </a:schemeClr>
+                    </a:gs>
+                  </a:gsLst>
+                  <a:lin ang="5400000" scaled="1"/>
+                </a:gradFill>
+                <a:ln w="12700">
+                  <a:solidFill>
+                    <a:schemeClr val="accent1"/>
+                  </a:solidFill>
+                </a:ln>
+              </p:spPr>
+              <p:style>
+                <a:lnRef idx="1">
+                  <a:schemeClr val="accent6"/>
+                </a:lnRef>
+                <a:fillRef idx="2">
+                  <a:schemeClr val="accent6"/>
+                </a:fillRef>
+                <a:effectRef idx="1">
+                  <a:schemeClr val="accent6"/>
+                </a:effectRef>
+                <a:fontRef idx="minor">
+                  <a:schemeClr val="dk1"/>
+                </a:fontRef>
+              </p:style>
+              <p:txBody>
+                <a:bodyPr rtlCol="0" anchor="ctr"/>
+                <a:lstStyle/>
+                <a:p>
+                  <a:pPr algn="ctr"/>
+                  <a:r>
+                    <a:rPr lang="en-SG" sz="1400" dirty="0" smtClean="0">
+                      <a:solidFill>
+                        <a:schemeClr val="accent1"/>
+                      </a:solidFill>
+                    </a:rPr>
+                    <a:t>:Command</a:t>
+                  </a:r>
+                  <a:endParaRPr lang="en-SG" sz="1400" dirty="0">
+                    <a:solidFill>
+                      <a:schemeClr val="accent1"/>
+                    </a:solidFill>
+                  </a:endParaRPr>
+                </a:p>
+              </p:txBody>
+            </p:sp>
+            <p:sp>
+              <p:nvSpPr>
+                <p:cNvPr id="46" name="Rectangle 45"/>
+                <p:cNvSpPr/>
+                <p:nvPr/>
+              </p:nvSpPr>
+              <p:spPr>
+                <a:xfrm>
+                  <a:off x="6360742" y="4246605"/>
+                  <a:ext cx="1636217" cy="533885"/>
+                </a:xfrm>
+                <a:prstGeom prst="rect">
+                  <a:avLst/>
+                </a:prstGeom>
+                <a:gradFill>
+                  <a:gsLst>
+                    <a:gs pos="29000">
+                      <a:schemeClr val="accent1">
+                        <a:lumMod val="40000"/>
+                        <a:lumOff val="60000"/>
+                      </a:schemeClr>
+                    </a:gs>
+                    <a:gs pos="100000">
+                      <a:schemeClr val="accent1">
+                        <a:lumMod val="20000"/>
+                        <a:lumOff val="80000"/>
+                      </a:schemeClr>
+                    </a:gs>
+                  </a:gsLst>
+                  <a:lin ang="5400000" scaled="1"/>
+                </a:gradFill>
+                <a:ln w="12700">
+                  <a:solidFill>
+                    <a:schemeClr val="accent1"/>
+                  </a:solidFill>
+                </a:ln>
+              </p:spPr>
+              <p:style>
+                <a:lnRef idx="1">
+                  <a:schemeClr val="accent6"/>
+                </a:lnRef>
+                <a:fillRef idx="2">
+                  <a:schemeClr val="accent6"/>
+                </a:fillRef>
+                <a:effectRef idx="1">
+                  <a:schemeClr val="accent6"/>
+                </a:effectRef>
+                <a:fontRef idx="minor">
+                  <a:schemeClr val="dk1"/>
+                </a:fontRef>
+              </p:style>
+              <p:txBody>
+                <a:bodyPr rtlCol="0" anchor="ctr"/>
+                <a:lstStyle/>
+                <a:p>
+                  <a:pPr algn="ctr"/>
+                  <a:r>
+                    <a:rPr lang="en-SG" sz="1400" dirty="0" err="1" smtClean="0">
+                      <a:solidFill>
+                        <a:schemeClr val="accent1"/>
+                      </a:solidFill>
+                    </a:rPr>
+                    <a:t>FoundCommand</a:t>
+                  </a:r>
+                  <a:endParaRPr lang="en-SG" sz="1400" dirty="0" smtClean="0">
+                    <a:solidFill>
+                      <a:schemeClr val="accent1"/>
+                    </a:solidFill>
+                  </a:endParaRPr>
+                </a:p>
+                <a:p>
+                  <a:pPr algn="ctr"/>
+                  <a:r>
+                    <a:rPr lang="en-SG" sz="1400" dirty="0" smtClean="0">
+                      <a:solidFill>
+                        <a:schemeClr val="accent1"/>
+                      </a:solidFill>
+                    </a:rPr>
+                    <a:t>:Command</a:t>
+                  </a:r>
+                  <a:endParaRPr lang="en-SG" sz="1400" dirty="0">
+                    <a:solidFill>
+                      <a:schemeClr val="accent1"/>
+                    </a:solidFill>
+                  </a:endParaRPr>
+                </a:p>
+              </p:txBody>
+            </p:sp>
+            <p:cxnSp>
+              <p:nvCxnSpPr>
+                <p:cNvPr id="48" name="Straight Connector 47"/>
+                <p:cNvCxnSpPr>
+                  <a:stCxn id="43" idx="2"/>
+                </p:cNvCxnSpPr>
+                <p:nvPr/>
+              </p:nvCxnSpPr>
+              <p:spPr>
+                <a:xfrm>
+                  <a:off x="2607460" y="1251229"/>
+                  <a:ext cx="0" cy="5400000"/>
+                </a:xfrm>
+                <a:prstGeom prst="line">
+                  <a:avLst/>
+                </a:prstGeom>
+                <a:ln w="19050">
+                  <a:solidFill>
+                    <a:schemeClr val="tx1"/>
+                  </a:solidFill>
+                  <a:prstDash val="sysDash"/>
+                </a:ln>
+              </p:spPr>
+              <p:style>
+                <a:lnRef idx="1">
+                  <a:schemeClr val="accent1"/>
+                </a:lnRef>
+                <a:fillRef idx="0">
+                  <a:schemeClr val="accent1"/>
+                </a:fillRef>
+                <a:effectRef idx="0">
+                  <a:schemeClr val="accent1"/>
+                </a:effectRef>
+                <a:fontRef idx="minor">
+                  <a:schemeClr val="tx1"/>
+                </a:fontRef>
+              </p:style>
+            </p:cxnSp>
+            <p:cxnSp>
+              <p:nvCxnSpPr>
+                <p:cNvPr id="51" name="Straight Connector 50"/>
+                <p:cNvCxnSpPr>
+                  <a:stCxn id="44" idx="2"/>
+                </p:cNvCxnSpPr>
+                <p:nvPr/>
+              </p:nvCxnSpPr>
+              <p:spPr>
+                <a:xfrm flipH="1">
+                  <a:off x="4906294" y="1442128"/>
+                  <a:ext cx="9244" cy="5220000"/>
+                </a:xfrm>
+                <a:prstGeom prst="line">
+                  <a:avLst/>
+                </a:prstGeom>
+                <a:ln w="19050">
+                  <a:solidFill>
+                    <a:schemeClr val="tx1"/>
+                  </a:solidFill>
+                  <a:prstDash val="sysDash"/>
+                </a:ln>
+              </p:spPr>
+              <p:style>
+                <a:lnRef idx="1">
+                  <a:schemeClr val="accent1"/>
+                </a:lnRef>
+                <a:fillRef idx="0">
+                  <a:schemeClr val="accent1"/>
+                </a:fillRef>
+                <a:effectRef idx="0">
+                  <a:schemeClr val="accent1"/>
+                </a:effectRef>
+                <a:fontRef idx="minor">
+                  <a:schemeClr val="tx1"/>
+                </a:fontRef>
+              </p:style>
+            </p:cxnSp>
+            <p:cxnSp>
+              <p:nvCxnSpPr>
+                <p:cNvPr id="66" name="Straight Connector 65"/>
+                <p:cNvCxnSpPr>
+                  <a:stCxn id="46" idx="2"/>
+                </p:cNvCxnSpPr>
+                <p:nvPr/>
+              </p:nvCxnSpPr>
+              <p:spPr>
+                <a:xfrm>
+                  <a:off x="7178851" y="4780490"/>
+                  <a:ext cx="1595" cy="1851316"/>
+                </a:xfrm>
+                <a:prstGeom prst="line">
+                  <a:avLst/>
+                </a:prstGeom>
+                <a:ln w="19050">
+                  <a:solidFill>
+                    <a:schemeClr val="tx1"/>
+                  </a:solidFill>
+                  <a:prstDash val="sysDash"/>
+                </a:ln>
+              </p:spPr>
+              <p:style>
+                <a:lnRef idx="1">
+                  <a:schemeClr val="accent1"/>
+                </a:lnRef>
+                <a:fillRef idx="0">
+                  <a:schemeClr val="accent1"/>
+                </a:fillRef>
+                <a:effectRef idx="0">
+                  <a:schemeClr val="accent1"/>
+                </a:effectRef>
+                <a:fontRef idx="minor">
+                  <a:schemeClr val="tx1"/>
+                </a:fontRef>
+              </p:style>
+            </p:cxnSp>
+            <p:sp>
+              <p:nvSpPr>
+                <p:cNvPr id="78" name="Rectangle 77"/>
+                <p:cNvSpPr/>
+                <p:nvPr/>
+              </p:nvSpPr>
+              <p:spPr>
+                <a:xfrm>
+                  <a:off x="2550814" y="1418389"/>
+                  <a:ext cx="108000" cy="5040000"/>
+                </a:xfrm>
+                <a:prstGeom prst="rect">
+                  <a:avLst/>
+                </a:prstGeom>
+                <a:gradFill>
+                  <a:gsLst>
+                    <a:gs pos="29000">
+                      <a:schemeClr val="accent1">
+                        <a:lumMod val="40000"/>
+                        <a:lumOff val="60000"/>
+                      </a:schemeClr>
+                    </a:gs>
+                    <a:gs pos="100000">
+                      <a:schemeClr val="accent1">
+                        <a:lumMod val="20000"/>
+                        <a:lumOff val="80000"/>
+                      </a:schemeClr>
+                    </a:gs>
+                  </a:gsLst>
+                  <a:lin ang="5400000" scaled="1"/>
+                </a:gradFill>
+                <a:ln w="12700">
+                  <a:solidFill>
+                    <a:schemeClr val="accent1"/>
+                  </a:solidFill>
+                </a:ln>
+              </p:spPr>
+              <p:style>
+                <a:lnRef idx="1">
+                  <a:schemeClr val="accent6"/>
+                </a:lnRef>
+                <a:fillRef idx="2">
+                  <a:schemeClr val="accent6"/>
+                </a:fillRef>
+                <a:effectRef idx="1">
+                  <a:schemeClr val="accent6"/>
+                </a:effectRef>
+                <a:fontRef idx="minor">
+                  <a:schemeClr val="dk1"/>
+                </a:fontRef>
+              </p:style>
+              <p:txBody>
+                <a:bodyPr rtlCol="0" anchor="ctr"/>
+                <a:lstStyle/>
+                <a:p>
+                  <a:pPr algn="ctr"/>
+                  <a:r>
+                    <a:rPr lang="en-SG" sz="1400" dirty="0" smtClean="0">
+                      <a:solidFill>
+                        <a:schemeClr val="accent1"/>
+                      </a:solidFill>
+                    </a:rPr>
+                    <a:t>:</a:t>
+                  </a:r>
+                  <a:endParaRPr lang="en-SG" sz="1400" dirty="0">
+                    <a:solidFill>
+                      <a:schemeClr val="accent1"/>
+                    </a:solidFill>
+                  </a:endParaRPr>
+                </a:p>
+              </p:txBody>
+            </p:sp>
+            <p:sp>
+              <p:nvSpPr>
+                <p:cNvPr id="79" name="Rectangle 78"/>
+                <p:cNvSpPr/>
+                <p:nvPr/>
+              </p:nvSpPr>
+              <p:spPr>
+                <a:xfrm>
+                  <a:off x="4861537" y="1822639"/>
+                  <a:ext cx="108000" cy="2160000"/>
+                </a:xfrm>
+                <a:prstGeom prst="rect">
+                  <a:avLst/>
+                </a:prstGeom>
+                <a:gradFill>
+                  <a:gsLst>
+                    <a:gs pos="29000">
+                      <a:schemeClr val="accent1">
+                        <a:lumMod val="40000"/>
+                        <a:lumOff val="60000"/>
+                      </a:schemeClr>
+                    </a:gs>
+                    <a:gs pos="100000">
+                      <a:schemeClr val="accent1">
+                        <a:lumMod val="20000"/>
+                        <a:lumOff val="80000"/>
+                      </a:schemeClr>
+                    </a:gs>
+                  </a:gsLst>
+                  <a:lin ang="5400000" scaled="1"/>
+                </a:gradFill>
+                <a:ln w="12700">
+                  <a:solidFill>
+                    <a:schemeClr val="accent1"/>
+                  </a:solidFill>
+                </a:ln>
+              </p:spPr>
+              <p:style>
+                <a:lnRef idx="1">
+                  <a:schemeClr val="accent6"/>
+                </a:lnRef>
+                <a:fillRef idx="2">
+                  <a:schemeClr val="accent6"/>
+                </a:fillRef>
+                <a:effectRef idx="1">
+                  <a:schemeClr val="accent6"/>
+                </a:effectRef>
+                <a:fontRef idx="minor">
+                  <a:schemeClr val="dk1"/>
+                </a:fontRef>
+              </p:style>
+              <p:txBody>
+                <a:bodyPr rtlCol="0" anchor="ctr"/>
+                <a:lstStyle/>
+                <a:p>
+                  <a:pPr algn="ctr"/>
+                  <a:r>
+                    <a:rPr lang="en-SG" sz="1400" dirty="0" smtClean="0">
+                      <a:solidFill>
+                        <a:schemeClr val="accent1"/>
+                      </a:solidFill>
+                    </a:rPr>
+                    <a:t>:</a:t>
+                  </a:r>
+                  <a:endParaRPr lang="en-SG" sz="1400" dirty="0">
+                    <a:solidFill>
+                      <a:schemeClr val="accent1"/>
+                    </a:solidFill>
+                  </a:endParaRPr>
+                </a:p>
+              </p:txBody>
+            </p:sp>
+            <p:sp>
+              <p:nvSpPr>
+                <p:cNvPr id="82" name="Rectangle 81"/>
+                <p:cNvSpPr/>
+                <p:nvPr/>
+              </p:nvSpPr>
+              <p:spPr>
+                <a:xfrm>
+                  <a:off x="4861537" y="4204014"/>
+                  <a:ext cx="108000" cy="1800000"/>
+                </a:xfrm>
+                <a:prstGeom prst="rect">
+                  <a:avLst/>
+                </a:prstGeom>
+                <a:gradFill>
+                  <a:gsLst>
+                    <a:gs pos="29000">
+                      <a:schemeClr val="accent1">
+                        <a:lumMod val="40000"/>
+                        <a:lumOff val="60000"/>
+                      </a:schemeClr>
+                    </a:gs>
+                    <a:gs pos="100000">
+                      <a:schemeClr val="accent1">
+                        <a:lumMod val="20000"/>
+                        <a:lumOff val="80000"/>
+                      </a:schemeClr>
+                    </a:gs>
+                  </a:gsLst>
+                  <a:lin ang="5400000" scaled="1"/>
+                </a:gradFill>
+                <a:ln w="12700">
+                  <a:solidFill>
+                    <a:schemeClr val="accent1"/>
+                  </a:solidFill>
+                </a:ln>
+              </p:spPr>
+              <p:style>
+                <a:lnRef idx="1">
+                  <a:schemeClr val="accent6"/>
+                </a:lnRef>
+                <a:fillRef idx="2">
+                  <a:schemeClr val="accent6"/>
+                </a:fillRef>
+                <a:effectRef idx="1">
+                  <a:schemeClr val="accent6"/>
+                </a:effectRef>
+                <a:fontRef idx="minor">
+                  <a:schemeClr val="dk1"/>
+                </a:fontRef>
+              </p:style>
+              <p:txBody>
+                <a:bodyPr rtlCol="0" anchor="ctr"/>
+                <a:lstStyle/>
+                <a:p>
+                  <a:pPr algn="ctr"/>
+                  <a:r>
+                    <a:rPr lang="en-SG" sz="1400" dirty="0" smtClean="0">
+                      <a:solidFill>
+                        <a:schemeClr val="accent1"/>
+                      </a:solidFill>
+                    </a:rPr>
+                    <a:t>:</a:t>
+                  </a:r>
+                  <a:endParaRPr lang="en-SG" sz="1400" dirty="0">
+                    <a:solidFill>
+                      <a:schemeClr val="accent1"/>
+                    </a:solidFill>
+                  </a:endParaRPr>
+                </a:p>
+              </p:txBody>
+            </p:sp>
+            <p:sp>
+              <p:nvSpPr>
+                <p:cNvPr id="83" name="Rectangle 82"/>
+                <p:cNvSpPr/>
+                <p:nvPr/>
+              </p:nvSpPr>
+              <p:spPr>
+                <a:xfrm>
+                  <a:off x="7131496" y="3208639"/>
+                  <a:ext cx="108000" cy="792000"/>
+                </a:xfrm>
+                <a:prstGeom prst="rect">
+                  <a:avLst/>
+                </a:prstGeom>
+                <a:gradFill>
+                  <a:gsLst>
+                    <a:gs pos="29000">
+                      <a:schemeClr val="accent1">
+                        <a:lumMod val="40000"/>
+                        <a:lumOff val="60000"/>
+                      </a:schemeClr>
+                    </a:gs>
+                    <a:gs pos="100000">
+                      <a:schemeClr val="accent1">
+                        <a:lumMod val="20000"/>
+                        <a:lumOff val="80000"/>
+                      </a:schemeClr>
+                    </a:gs>
+                  </a:gsLst>
+                  <a:lin ang="5400000" scaled="1"/>
+                </a:gradFill>
+                <a:ln w="12700">
+                  <a:solidFill>
+                    <a:schemeClr val="accent1"/>
+                  </a:solidFill>
+                </a:ln>
+              </p:spPr>
+              <p:style>
+                <a:lnRef idx="1">
+                  <a:schemeClr val="accent6"/>
+                </a:lnRef>
+                <a:fillRef idx="2">
+                  <a:schemeClr val="accent6"/>
+                </a:fillRef>
+                <a:effectRef idx="1">
+                  <a:schemeClr val="accent6"/>
+                </a:effectRef>
+                <a:fontRef idx="minor">
+                  <a:schemeClr val="dk1"/>
+                </a:fontRef>
+              </p:style>
+              <p:txBody>
+                <a:bodyPr rtlCol="0" anchor="ctr"/>
+                <a:lstStyle/>
+                <a:p>
+                  <a:pPr algn="ctr"/>
+                  <a:r>
+                    <a:rPr lang="en-SG" sz="1400" dirty="0" smtClean="0">
+                      <a:solidFill>
+                        <a:schemeClr val="accent1"/>
+                      </a:solidFill>
+                    </a:rPr>
+                    <a:t>:</a:t>
+                  </a:r>
+                  <a:endParaRPr lang="en-SG" sz="1400" dirty="0">
+                    <a:solidFill>
+                      <a:schemeClr val="accent1"/>
+                    </a:solidFill>
+                  </a:endParaRPr>
+                </a:p>
+              </p:txBody>
+            </p:sp>
+            <p:grpSp>
+              <p:nvGrpSpPr>
+                <p:cNvPr id="90" name="Group 89"/>
+                <p:cNvGrpSpPr/>
+                <p:nvPr/>
+              </p:nvGrpSpPr>
+              <p:grpSpPr>
+                <a:xfrm>
+                  <a:off x="288757" y="1434172"/>
+                  <a:ext cx="2242686" cy="356135"/>
+                  <a:chOff x="240632" y="1722922"/>
+                  <a:chExt cx="2242686" cy="356135"/>
+                </a:xfrm>
+              </p:grpSpPr>
+              <p:cxnSp>
+                <p:nvCxnSpPr>
+                  <p:cNvPr id="85" name="Straight Arrow Connector 84"/>
+                  <p:cNvCxnSpPr/>
+                  <p:nvPr/>
+                </p:nvCxnSpPr>
+                <p:spPr>
+                  <a:xfrm>
+                    <a:off x="240632" y="2079057"/>
+                    <a:ext cx="2242686" cy="0"/>
+                  </a:xfrm>
+                  <a:prstGeom prst="straightConnector1">
+                    <a:avLst/>
+                  </a:prstGeom>
+                  <a:ln w="28575">
+                    <a:solidFill>
+                      <a:schemeClr val="accent1">
+                        <a:lumMod val="75000"/>
+                      </a:schemeClr>
+                    </a:solidFill>
+                    <a:tailEnd type="arrow"/>
+                  </a:ln>
+                </p:spPr>
+                <p:style>
+                  <a:lnRef idx="1">
+                    <a:schemeClr val="accent1"/>
+                  </a:lnRef>
+                  <a:fillRef idx="0">
+                    <a:schemeClr val="accent1"/>
+                  </a:fillRef>
+                  <a:effectRef idx="0">
+                    <a:schemeClr val="accent1"/>
+                  </a:effectRef>
+                  <a:fontRef idx="minor">
+                    <a:schemeClr val="tx1"/>
+                  </a:fontRef>
+                </p:style>
+              </p:cxnSp>
+              <p:sp>
+                <p:nvSpPr>
+                  <p:cNvPr id="89" name="TextBox 88"/>
+                  <p:cNvSpPr txBox="1"/>
+                  <p:nvPr/>
+                </p:nvSpPr>
+                <p:spPr>
+                  <a:xfrm>
+                    <a:off x="250257" y="1722922"/>
+                    <a:ext cx="2233061" cy="353943"/>
+                  </a:xfrm>
+                  <a:prstGeom prst="rect">
+                    <a:avLst/>
+                  </a:prstGeom>
+                  <a:noFill/>
+                </p:spPr>
+                <p:txBody>
+                  <a:bodyPr wrap="square" rtlCol="0">
+                    <a:spAutoFit/>
+                  </a:bodyPr>
+                  <a:lstStyle/>
+                  <a:p>
+                    <a:pPr algn="ctr"/>
+                    <a:r>
+                      <a:rPr lang="en-SG" sz="1700" i="1" dirty="0" smtClean="0"/>
+                      <a:t>execute(</a:t>
+                    </a:r>
+                    <a:r>
+                      <a:rPr lang="en-SG" sz="1700" i="1" dirty="0" err="1" smtClean="0"/>
+                      <a:t>userInput</a:t>
+                    </a:r>
+                    <a:r>
+                      <a:rPr lang="en-SG" sz="1700" i="1" dirty="0" smtClean="0"/>
+                      <a:t>);</a:t>
+                    </a:r>
+                    <a:endParaRPr lang="en-SG" sz="1700" i="1" dirty="0"/>
+                  </a:p>
+                </p:txBody>
+              </p:sp>
+            </p:grpSp>
+            <p:grpSp>
+              <p:nvGrpSpPr>
+                <p:cNvPr id="22" name="Group 21"/>
+                <p:cNvGrpSpPr/>
+                <p:nvPr/>
+              </p:nvGrpSpPr>
+              <p:grpSpPr>
+                <a:xfrm>
+                  <a:off x="2508192" y="1750201"/>
+                  <a:ext cx="2520000" cy="385010"/>
+                  <a:chOff x="141981" y="1694047"/>
+                  <a:chExt cx="2520000" cy="385010"/>
+                </a:xfrm>
+              </p:grpSpPr>
+              <p:cxnSp>
+                <p:nvCxnSpPr>
+                  <p:cNvPr id="23" name="Straight Arrow Connector 22"/>
+                  <p:cNvCxnSpPr/>
+                  <p:nvPr/>
+                </p:nvCxnSpPr>
+                <p:spPr>
+                  <a:xfrm>
+                    <a:off x="339981" y="2079057"/>
+                    <a:ext cx="2124000" cy="0"/>
+                  </a:xfrm>
+                  <a:prstGeom prst="straightConnector1">
+                    <a:avLst/>
+                  </a:prstGeom>
+                  <a:ln w="28575">
+                    <a:solidFill>
+                      <a:schemeClr val="accent1">
+                        <a:lumMod val="75000"/>
+                      </a:schemeClr>
+                    </a:solidFill>
+                    <a:tailEnd type="arrow"/>
+                  </a:ln>
+                </p:spPr>
+                <p:style>
+                  <a:lnRef idx="1">
+                    <a:schemeClr val="accent1"/>
+                  </a:lnRef>
+                  <a:fillRef idx="0">
+                    <a:schemeClr val="accent1"/>
+                  </a:fillRef>
+                  <a:effectRef idx="0">
+                    <a:schemeClr val="accent1"/>
+                  </a:effectRef>
+                  <a:fontRef idx="minor">
+                    <a:schemeClr val="tx1"/>
+                  </a:fontRef>
+                </p:style>
+              </p:cxnSp>
+              <p:sp>
+                <p:nvSpPr>
+                  <p:cNvPr id="24" name="TextBox 23"/>
+                  <p:cNvSpPr txBox="1"/>
+                  <p:nvPr/>
+                </p:nvSpPr>
+                <p:spPr>
+                  <a:xfrm>
+                    <a:off x="141981" y="1694047"/>
+                    <a:ext cx="2520000" cy="353943"/>
+                  </a:xfrm>
+                  <a:prstGeom prst="rect">
+                    <a:avLst/>
+                  </a:prstGeom>
+                  <a:noFill/>
+                </p:spPr>
+                <p:txBody>
+                  <a:bodyPr wrap="square" rtlCol="0">
+                    <a:spAutoFit/>
+                  </a:bodyPr>
+                  <a:lstStyle/>
+                  <a:p>
+                    <a:pPr algn="ctr"/>
+                    <a:r>
+                      <a:rPr lang="en-SG" sz="1700" i="1" dirty="0" err="1" smtClean="0"/>
+                      <a:t>delegateCommand</a:t>
+                    </a:r>
+                    <a:r>
+                      <a:rPr lang="en-SG" sz="1700" i="1" dirty="0" smtClean="0"/>
+                      <a:t>();</a:t>
+                    </a:r>
+                    <a:endParaRPr lang="en-SG" sz="1700" i="1" dirty="0"/>
+                  </a:p>
+                </p:txBody>
+              </p:sp>
+            </p:grpSp>
+            <p:grpSp>
+              <p:nvGrpSpPr>
+                <p:cNvPr id="25" name="Group 24"/>
+                <p:cNvGrpSpPr/>
+                <p:nvPr/>
+              </p:nvGrpSpPr>
+              <p:grpSpPr>
+                <a:xfrm>
+                  <a:off x="4787717" y="3057601"/>
+                  <a:ext cx="2520000" cy="385010"/>
+                  <a:chOff x="141981" y="1694047"/>
+                  <a:chExt cx="2520000" cy="385010"/>
+                </a:xfrm>
+              </p:grpSpPr>
+              <p:cxnSp>
+                <p:nvCxnSpPr>
+                  <p:cNvPr id="26" name="Straight Arrow Connector 25"/>
+                  <p:cNvCxnSpPr/>
+                  <p:nvPr/>
+                </p:nvCxnSpPr>
+                <p:spPr>
+                  <a:xfrm>
+                    <a:off x="339981" y="2079057"/>
+                    <a:ext cx="2124000" cy="0"/>
+                  </a:xfrm>
+                  <a:prstGeom prst="straightConnector1">
+                    <a:avLst/>
+                  </a:prstGeom>
+                  <a:ln w="28575">
+                    <a:solidFill>
+                      <a:schemeClr val="accent1">
+                        <a:lumMod val="75000"/>
+                      </a:schemeClr>
+                    </a:solidFill>
+                    <a:tailEnd type="arrow"/>
+                  </a:ln>
+                </p:spPr>
+                <p:style>
+                  <a:lnRef idx="1">
+                    <a:schemeClr val="accent1"/>
+                  </a:lnRef>
+                  <a:fillRef idx="0">
+                    <a:schemeClr val="accent1"/>
+                  </a:fillRef>
+                  <a:effectRef idx="0">
+                    <a:schemeClr val="accent1"/>
+                  </a:effectRef>
+                  <a:fontRef idx="minor">
+                    <a:schemeClr val="tx1"/>
+                  </a:fontRef>
+                </p:style>
+              </p:cxnSp>
+              <p:sp>
+                <p:nvSpPr>
+                  <p:cNvPr id="27" name="TextBox 26"/>
+                  <p:cNvSpPr txBox="1"/>
+                  <p:nvPr/>
+                </p:nvSpPr>
+                <p:spPr>
+                  <a:xfrm>
+                    <a:off x="141981" y="1694047"/>
+                    <a:ext cx="2520000" cy="353943"/>
+                  </a:xfrm>
+                  <a:prstGeom prst="rect">
+                    <a:avLst/>
+                  </a:prstGeom>
+                  <a:noFill/>
+                </p:spPr>
+                <p:txBody>
+                  <a:bodyPr wrap="square" rtlCol="0">
+                    <a:spAutoFit/>
+                  </a:bodyPr>
+                  <a:lstStyle/>
+                  <a:p>
+                    <a:pPr algn="ctr"/>
+                    <a:r>
+                      <a:rPr lang="en-SG" sz="1700" i="1" dirty="0" err="1" smtClean="0"/>
+                      <a:t>respondTo</a:t>
+                    </a:r>
+                    <a:r>
+                      <a:rPr lang="en-SG" sz="1700" dirty="0" smtClean="0"/>
+                      <a:t>();</a:t>
+                    </a:r>
+                    <a:endParaRPr lang="en-SG" sz="1700" dirty="0"/>
+                  </a:p>
+                </p:txBody>
+              </p:sp>
+            </p:grpSp>
+            <p:sp>
+              <p:nvSpPr>
+                <p:cNvPr id="28" name="Rectangle 27"/>
+                <p:cNvSpPr/>
+                <p:nvPr/>
+              </p:nvSpPr>
+              <p:spPr>
+                <a:xfrm>
+                  <a:off x="4081112" y="2252312"/>
+                  <a:ext cx="4235115" cy="1886552"/>
+                </a:xfrm>
+                <a:prstGeom prst="rect">
+                  <a:avLst/>
+                </a:prstGeom>
+                <a:noFill/>
+                <a:ln w="28575">
+                  <a:solidFill>
+                    <a:schemeClr val="tx1"/>
+                  </a:solidFill>
+                </a:ln>
+              </p:spPr>
+              <p:style>
+                <a:lnRef idx="2">
+                  <a:schemeClr val="accent1">
+                    <a:shade val="50000"/>
+                  </a:schemeClr>
+                </a:lnRef>
+                <a:fillRef idx="1">
+                  <a:schemeClr val="accent1"/>
+                </a:fillRef>
+                <a:effectRef idx="0">
+                  <a:schemeClr val="accent1"/>
+                </a:effectRef>
+                <a:fontRef idx="minor">
+                  <a:schemeClr val="lt1"/>
+                </a:fontRef>
+              </p:style>
+              <p:txBody>
+                <a:bodyPr rtlCol="0" anchor="ctr"/>
+                <a:lstStyle/>
+                <a:p>
+                  <a:pPr algn="ctr"/>
+                  <a:endParaRPr lang="en-SG"/>
+                </a:p>
+              </p:txBody>
+            </p:sp>
+            <p:sp>
+              <p:nvSpPr>
+                <p:cNvPr id="29" name="Rectangle 28"/>
+                <p:cNvSpPr/>
+                <p:nvPr/>
+              </p:nvSpPr>
+              <p:spPr>
+                <a:xfrm>
+                  <a:off x="4081113" y="2252313"/>
+                  <a:ext cx="693017" cy="385010"/>
+                </a:xfrm>
+                <a:prstGeom prst="rect">
+                  <a:avLst/>
+                </a:prstGeom>
+                <a:noFill/>
+                <a:ln w="28575">
+                  <a:solidFill>
+                    <a:schemeClr val="tx1"/>
+                  </a:solidFill>
+                </a:ln>
+              </p:spPr>
+              <p:style>
+                <a:lnRef idx="2">
+                  <a:schemeClr val="accent1">
+                    <a:shade val="50000"/>
+                  </a:schemeClr>
+                </a:lnRef>
+                <a:fillRef idx="1">
+                  <a:schemeClr val="accent1"/>
+                </a:fillRef>
+                <a:effectRef idx="0">
+                  <a:schemeClr val="accent1"/>
+                </a:effectRef>
+                <a:fontRef idx="minor">
+                  <a:schemeClr val="lt1"/>
+                </a:fontRef>
+              </p:style>
+              <p:txBody>
+                <a:bodyPr rtlCol="0" anchor="ctr"/>
+                <a:lstStyle/>
+                <a:p>
+                  <a:pPr algn="ctr"/>
+                  <a:r>
+                    <a:rPr lang="en-SG" dirty="0" smtClean="0">
+                      <a:solidFill>
+                        <a:sysClr val="windowText" lastClr="000000"/>
+                      </a:solidFill>
+                    </a:rPr>
+                    <a:t>Loop</a:t>
+                  </a:r>
+                  <a:endParaRPr lang="en-SG" dirty="0">
+                    <a:solidFill>
+                      <a:sysClr val="windowText" lastClr="000000"/>
+                    </a:solidFill>
+                  </a:endParaRPr>
+                </a:p>
+              </p:txBody>
+            </p:sp>
+            <p:grpSp>
+              <p:nvGrpSpPr>
+                <p:cNvPr id="32" name="Group 31"/>
+                <p:cNvGrpSpPr/>
+                <p:nvPr/>
+              </p:nvGrpSpPr>
+              <p:grpSpPr>
+                <a:xfrm>
+                  <a:off x="4776492" y="4788501"/>
+                  <a:ext cx="2520000" cy="385010"/>
+                  <a:chOff x="141981" y="1694047"/>
+                  <a:chExt cx="2520000" cy="385010"/>
+                </a:xfrm>
+              </p:grpSpPr>
+              <p:cxnSp>
+                <p:nvCxnSpPr>
+                  <p:cNvPr id="33" name="Straight Arrow Connector 32"/>
+                  <p:cNvCxnSpPr/>
+                  <p:nvPr/>
+                </p:nvCxnSpPr>
+                <p:spPr>
+                  <a:xfrm>
+                    <a:off x="339981" y="2079057"/>
+                    <a:ext cx="2124000" cy="0"/>
+                  </a:xfrm>
+                  <a:prstGeom prst="straightConnector1">
+                    <a:avLst/>
+                  </a:prstGeom>
+                  <a:ln w="28575">
+                    <a:solidFill>
+                      <a:schemeClr val="accent1">
+                        <a:lumMod val="75000"/>
+                      </a:schemeClr>
+                    </a:solidFill>
+                    <a:tailEnd type="arrow"/>
+                  </a:ln>
+                </p:spPr>
+                <p:style>
+                  <a:lnRef idx="1">
+                    <a:schemeClr val="accent1"/>
+                  </a:lnRef>
+                  <a:fillRef idx="0">
+                    <a:schemeClr val="accent1"/>
+                  </a:fillRef>
+                  <a:effectRef idx="0">
+                    <a:schemeClr val="accent1"/>
+                  </a:effectRef>
+                  <a:fontRef idx="minor">
+                    <a:schemeClr val="tx1"/>
+                  </a:fontRef>
+                </p:style>
+              </p:cxnSp>
+              <p:sp>
+                <p:nvSpPr>
+                  <p:cNvPr id="34" name="TextBox 33"/>
+                  <p:cNvSpPr txBox="1"/>
+                  <p:nvPr/>
+                </p:nvSpPr>
+                <p:spPr>
+                  <a:xfrm>
+                    <a:off x="141981" y="1694047"/>
+                    <a:ext cx="2520000" cy="353943"/>
+                  </a:xfrm>
+                  <a:prstGeom prst="rect">
+                    <a:avLst/>
+                  </a:prstGeom>
+                  <a:noFill/>
+                </p:spPr>
+                <p:txBody>
+                  <a:bodyPr wrap="square" rtlCol="0">
+                    <a:spAutoFit/>
+                  </a:bodyPr>
+                  <a:lstStyle/>
+                  <a:p>
+                    <a:pPr algn="ctr"/>
+                    <a:r>
+                      <a:rPr lang="en-SG" sz="1700" i="1" dirty="0" smtClean="0"/>
+                      <a:t>execute(</a:t>
+                    </a:r>
+                    <a:r>
+                      <a:rPr lang="en-SG" sz="1700" i="1" dirty="0" err="1" smtClean="0"/>
+                      <a:t>userInput</a:t>
+                    </a:r>
+                    <a:r>
+                      <a:rPr lang="en-SG" sz="1700" i="1" dirty="0" smtClean="0"/>
+                      <a:t>);</a:t>
+                    </a:r>
+                    <a:endParaRPr lang="en-SG" sz="1700" i="1" dirty="0"/>
+                  </a:p>
+                </p:txBody>
+              </p:sp>
+            </p:grpSp>
+            <p:sp>
+              <p:nvSpPr>
+                <p:cNvPr id="35" name="Rectangle 34"/>
+                <p:cNvSpPr/>
+                <p:nvPr/>
+              </p:nvSpPr>
+              <p:spPr>
+                <a:xfrm>
+                  <a:off x="7124850" y="4885805"/>
+                  <a:ext cx="108000" cy="1080000"/>
+                </a:xfrm>
+                <a:prstGeom prst="rect">
+                  <a:avLst/>
+                </a:prstGeom>
+                <a:gradFill>
+                  <a:gsLst>
+                    <a:gs pos="29000">
+                      <a:schemeClr val="accent1">
+                        <a:lumMod val="40000"/>
+                        <a:lumOff val="60000"/>
+                      </a:schemeClr>
+                    </a:gs>
+                    <a:gs pos="100000">
+                      <a:schemeClr val="accent1">
+                        <a:lumMod val="20000"/>
+                        <a:lumOff val="80000"/>
+                      </a:schemeClr>
+                    </a:gs>
+                  </a:gsLst>
+                  <a:lin ang="5400000" scaled="1"/>
+                </a:gradFill>
+                <a:ln w="12700">
+                  <a:solidFill>
+                    <a:schemeClr val="accent1"/>
+                  </a:solidFill>
+                </a:ln>
+              </p:spPr>
+              <p:style>
+                <a:lnRef idx="1">
+                  <a:schemeClr val="accent6"/>
+                </a:lnRef>
+                <a:fillRef idx="2">
+                  <a:schemeClr val="accent6"/>
+                </a:fillRef>
+                <a:effectRef idx="1">
+                  <a:schemeClr val="accent6"/>
+                </a:effectRef>
+                <a:fontRef idx="minor">
+                  <a:schemeClr val="dk1"/>
+                </a:fontRef>
+              </p:style>
+              <p:txBody>
+                <a:bodyPr rtlCol="0" anchor="ctr"/>
+                <a:lstStyle/>
+                <a:p>
+                  <a:pPr algn="ctr"/>
+                  <a:r>
+                    <a:rPr lang="en-SG" sz="1400" dirty="0" smtClean="0">
+                      <a:solidFill>
+                        <a:schemeClr val="accent1"/>
+                      </a:solidFill>
+                    </a:rPr>
+                    <a:t>:</a:t>
+                  </a:r>
+                  <a:endParaRPr lang="en-SG" sz="1400" dirty="0">
+                    <a:solidFill>
+                      <a:schemeClr val="accent1"/>
+                    </a:solidFill>
+                  </a:endParaRPr>
+                </a:p>
+              </p:txBody>
+            </p:sp>
+            <p:grpSp>
+              <p:nvGrpSpPr>
+                <p:cNvPr id="36" name="Group 35"/>
+                <p:cNvGrpSpPr/>
+                <p:nvPr/>
+              </p:nvGrpSpPr>
+              <p:grpSpPr>
+                <a:xfrm>
+                  <a:off x="4776492" y="3489126"/>
+                  <a:ext cx="2520000" cy="385010"/>
+                  <a:chOff x="141981" y="1694047"/>
+                  <a:chExt cx="2520000" cy="385010"/>
+                </a:xfrm>
+              </p:grpSpPr>
+              <p:cxnSp>
+                <p:nvCxnSpPr>
+                  <p:cNvPr id="37" name="Straight Arrow Connector 36"/>
+                  <p:cNvCxnSpPr/>
+                  <p:nvPr/>
+                </p:nvCxnSpPr>
+                <p:spPr>
+                  <a:xfrm>
+                    <a:off x="339981" y="2079057"/>
+                    <a:ext cx="2124000" cy="0"/>
+                  </a:xfrm>
+                  <a:prstGeom prst="straightConnector1">
+                    <a:avLst/>
+                  </a:prstGeom>
+                  <a:ln w="28575">
+                    <a:solidFill>
+                      <a:schemeClr val="accent1">
+                        <a:lumMod val="75000"/>
+                      </a:schemeClr>
+                    </a:solidFill>
+                    <a:prstDash val="sysDash"/>
+                    <a:headEnd type="arrow" w="med" len="med"/>
+                    <a:tailEnd type="none" w="med" len="med"/>
+                  </a:ln>
+                </p:spPr>
+                <p:style>
+                  <a:lnRef idx="1">
+                    <a:schemeClr val="accent1"/>
+                  </a:lnRef>
+                  <a:fillRef idx="0">
+                    <a:schemeClr val="accent1"/>
+                  </a:fillRef>
+                  <a:effectRef idx="0">
+                    <a:schemeClr val="accent1"/>
+                  </a:effectRef>
+                  <a:fontRef idx="minor">
+                    <a:schemeClr val="tx1"/>
+                  </a:fontRef>
+                </p:style>
+              </p:cxnSp>
+              <p:sp>
+                <p:nvSpPr>
+                  <p:cNvPr id="38" name="TextBox 37"/>
+                  <p:cNvSpPr txBox="1"/>
+                  <p:nvPr/>
+                </p:nvSpPr>
+                <p:spPr>
+                  <a:xfrm>
+                    <a:off x="141981" y="1694047"/>
+                    <a:ext cx="2520000" cy="353943"/>
+                  </a:xfrm>
+                  <a:prstGeom prst="rect">
+                    <a:avLst/>
+                  </a:prstGeom>
+                  <a:noFill/>
+                </p:spPr>
+                <p:txBody>
+                  <a:bodyPr wrap="square" rtlCol="0">
+                    <a:spAutoFit/>
+                  </a:bodyPr>
+                  <a:lstStyle/>
+                  <a:p>
+                    <a:pPr algn="ctr"/>
+                    <a:r>
+                      <a:rPr lang="en-SG" sz="1700" i="1" dirty="0" smtClean="0"/>
+                      <a:t>return true/false</a:t>
+                    </a:r>
+                    <a:endParaRPr lang="en-SG" sz="1700" i="1" dirty="0"/>
+                  </a:p>
+                </p:txBody>
+              </p:sp>
+            </p:grpSp>
+            <p:grpSp>
+              <p:nvGrpSpPr>
+                <p:cNvPr id="39" name="Group 38"/>
+                <p:cNvGrpSpPr/>
+                <p:nvPr/>
+              </p:nvGrpSpPr>
+              <p:grpSpPr>
+                <a:xfrm>
+                  <a:off x="4765267" y="5248901"/>
+                  <a:ext cx="2520000" cy="385010"/>
+                  <a:chOff x="141981" y="1694047"/>
+                  <a:chExt cx="2520000" cy="385010"/>
+                </a:xfrm>
+              </p:grpSpPr>
+              <p:cxnSp>
+                <p:nvCxnSpPr>
+                  <p:cNvPr id="40" name="Straight Arrow Connector 39"/>
+                  <p:cNvCxnSpPr/>
+                  <p:nvPr/>
+                </p:nvCxnSpPr>
+                <p:spPr>
+                  <a:xfrm>
+                    <a:off x="339981" y="2079057"/>
+                    <a:ext cx="2124000" cy="0"/>
+                  </a:xfrm>
+                  <a:prstGeom prst="straightConnector1">
+                    <a:avLst/>
+                  </a:prstGeom>
+                  <a:ln w="28575">
+                    <a:solidFill>
+                      <a:schemeClr val="accent1">
+                        <a:lumMod val="75000"/>
+                      </a:schemeClr>
+                    </a:solidFill>
+                    <a:prstDash val="sysDash"/>
+                    <a:headEnd type="arrow" w="med" len="med"/>
+                    <a:tailEnd type="none" w="med" len="med"/>
+                  </a:ln>
+                </p:spPr>
+                <p:style>
+                  <a:lnRef idx="1">
+                    <a:schemeClr val="accent1"/>
+                  </a:lnRef>
+                  <a:fillRef idx="0">
+                    <a:schemeClr val="accent1"/>
+                  </a:fillRef>
+                  <a:effectRef idx="0">
+                    <a:schemeClr val="accent1"/>
+                  </a:effectRef>
+                  <a:fontRef idx="minor">
+                    <a:schemeClr val="tx1"/>
+                  </a:fontRef>
+                </p:style>
+              </p:cxnSp>
+              <p:sp>
+                <p:nvSpPr>
+                  <p:cNvPr id="41" name="TextBox 40"/>
+                  <p:cNvSpPr txBox="1"/>
+                  <p:nvPr/>
+                </p:nvSpPr>
+                <p:spPr>
+                  <a:xfrm>
+                    <a:off x="141981" y="1694047"/>
+                    <a:ext cx="2520000" cy="353943"/>
+                  </a:xfrm>
+                  <a:prstGeom prst="rect">
+                    <a:avLst/>
+                  </a:prstGeom>
+                  <a:noFill/>
+                </p:spPr>
+                <p:txBody>
+                  <a:bodyPr wrap="square" rtlCol="0">
+                    <a:spAutoFit/>
+                  </a:bodyPr>
+                  <a:lstStyle/>
+                  <a:p>
+                    <a:pPr algn="ctr"/>
+                    <a:r>
+                      <a:rPr lang="en-SG" sz="1700" i="1" dirty="0" smtClean="0"/>
+                      <a:t>return </a:t>
+                    </a:r>
+                    <a:r>
+                      <a:rPr lang="en-SG" sz="1700" i="1" dirty="0" err="1" smtClean="0"/>
+                      <a:t>CommandResult</a:t>
+                    </a:r>
+                    <a:endParaRPr lang="en-SG" sz="1700" i="1" dirty="0"/>
+                  </a:p>
+                </p:txBody>
+              </p:sp>
+            </p:grpSp>
+            <p:grpSp>
+              <p:nvGrpSpPr>
+                <p:cNvPr id="42" name="Group 41"/>
+                <p:cNvGrpSpPr/>
+                <p:nvPr/>
+              </p:nvGrpSpPr>
+              <p:grpSpPr>
+                <a:xfrm>
+                  <a:off x="2501792" y="5420551"/>
+                  <a:ext cx="2520000" cy="385010"/>
+                  <a:chOff x="141981" y="1694047"/>
+                  <a:chExt cx="2520000" cy="385010"/>
+                </a:xfrm>
+              </p:grpSpPr>
+              <p:cxnSp>
+                <p:nvCxnSpPr>
+                  <p:cNvPr id="47" name="Straight Arrow Connector 46"/>
+                  <p:cNvCxnSpPr/>
+                  <p:nvPr/>
+                </p:nvCxnSpPr>
+                <p:spPr>
+                  <a:xfrm>
+                    <a:off x="339981" y="2079057"/>
+                    <a:ext cx="2124000" cy="0"/>
+                  </a:xfrm>
+                  <a:prstGeom prst="straightConnector1">
+                    <a:avLst/>
+                  </a:prstGeom>
+                  <a:ln w="28575">
+                    <a:solidFill>
+                      <a:schemeClr val="accent1">
+                        <a:lumMod val="75000"/>
+                      </a:schemeClr>
+                    </a:solidFill>
+                    <a:prstDash val="sysDash"/>
+                    <a:headEnd type="arrow" w="med" len="med"/>
+                    <a:tailEnd type="none" w="med" len="med"/>
+                  </a:ln>
+                </p:spPr>
+                <p:style>
+                  <a:lnRef idx="1">
+                    <a:schemeClr val="accent1"/>
+                  </a:lnRef>
+                  <a:fillRef idx="0">
+                    <a:schemeClr val="accent1"/>
+                  </a:fillRef>
+                  <a:effectRef idx="0">
+                    <a:schemeClr val="accent1"/>
+                  </a:effectRef>
+                  <a:fontRef idx="minor">
+                    <a:schemeClr val="tx1"/>
+                  </a:fontRef>
+                </p:style>
+              </p:cxnSp>
+              <p:sp>
+                <p:nvSpPr>
+                  <p:cNvPr id="49" name="TextBox 48"/>
+                  <p:cNvSpPr txBox="1"/>
+                  <p:nvPr/>
+                </p:nvSpPr>
+                <p:spPr>
+                  <a:xfrm>
+                    <a:off x="141981" y="1694047"/>
+                    <a:ext cx="2520000" cy="353943"/>
+                  </a:xfrm>
+                  <a:prstGeom prst="rect">
+                    <a:avLst/>
+                  </a:prstGeom>
+                  <a:noFill/>
+                </p:spPr>
+                <p:txBody>
+                  <a:bodyPr wrap="square" rtlCol="0">
+                    <a:spAutoFit/>
+                  </a:bodyPr>
+                  <a:lstStyle/>
+                  <a:p>
+                    <a:pPr algn="ctr"/>
+                    <a:r>
+                      <a:rPr lang="en-SG" sz="1700" i="1" dirty="0" smtClean="0"/>
+                      <a:t>return </a:t>
+                    </a:r>
+                    <a:r>
+                      <a:rPr lang="en-SG" sz="1700" i="1" dirty="0" err="1" smtClean="0"/>
+                      <a:t>CommandResult</a:t>
+                    </a:r>
+                    <a:endParaRPr lang="en-SG" sz="1700" i="1" dirty="0"/>
+                  </a:p>
+                </p:txBody>
+              </p:sp>
+            </p:grpSp>
+            <p:grpSp>
+              <p:nvGrpSpPr>
+                <p:cNvPr id="50" name="Group 49"/>
+                <p:cNvGrpSpPr/>
+                <p:nvPr/>
+              </p:nvGrpSpPr>
+              <p:grpSpPr>
+                <a:xfrm>
+                  <a:off x="180567" y="5611451"/>
+                  <a:ext cx="2520000" cy="385010"/>
+                  <a:chOff x="141981" y="1694047"/>
+                  <a:chExt cx="2520000" cy="385010"/>
+                </a:xfrm>
+              </p:grpSpPr>
+              <p:cxnSp>
+                <p:nvCxnSpPr>
+                  <p:cNvPr id="52" name="Straight Arrow Connector 51"/>
+                  <p:cNvCxnSpPr/>
+                  <p:nvPr/>
+                </p:nvCxnSpPr>
+                <p:spPr>
+                  <a:xfrm>
+                    <a:off x="339981" y="2079057"/>
+                    <a:ext cx="2124000" cy="0"/>
+                  </a:xfrm>
+                  <a:prstGeom prst="straightConnector1">
+                    <a:avLst/>
+                  </a:prstGeom>
+                  <a:ln w="28575">
+                    <a:solidFill>
+                      <a:schemeClr val="accent1">
+                        <a:lumMod val="75000"/>
+                      </a:schemeClr>
+                    </a:solidFill>
+                    <a:prstDash val="sysDash"/>
+                    <a:headEnd type="arrow" w="med" len="med"/>
+                    <a:tailEnd type="none" w="med" len="med"/>
+                  </a:ln>
+                </p:spPr>
+                <p:style>
+                  <a:lnRef idx="1">
+                    <a:schemeClr val="accent1"/>
+                  </a:lnRef>
+                  <a:fillRef idx="0">
+                    <a:schemeClr val="accent1"/>
+                  </a:fillRef>
+                  <a:effectRef idx="0">
+                    <a:schemeClr val="accent1"/>
+                  </a:effectRef>
+                  <a:fontRef idx="minor">
+                    <a:schemeClr val="tx1"/>
+                  </a:fontRef>
+                </p:style>
+              </p:cxnSp>
+              <p:sp>
+                <p:nvSpPr>
+                  <p:cNvPr id="54" name="TextBox 53"/>
+                  <p:cNvSpPr txBox="1"/>
+                  <p:nvPr/>
+                </p:nvSpPr>
+                <p:spPr>
+                  <a:xfrm>
+                    <a:off x="141981" y="1694047"/>
+                    <a:ext cx="2520000" cy="353943"/>
+                  </a:xfrm>
+                  <a:prstGeom prst="rect">
+                    <a:avLst/>
+                  </a:prstGeom>
+                  <a:noFill/>
+                </p:spPr>
+                <p:txBody>
+                  <a:bodyPr wrap="square" rtlCol="0">
+                    <a:spAutoFit/>
+                  </a:bodyPr>
+                  <a:lstStyle/>
+                  <a:p>
+                    <a:pPr algn="ctr"/>
+                    <a:r>
+                      <a:rPr lang="en-SG" sz="1700" i="1" dirty="0" smtClean="0"/>
+                      <a:t>return </a:t>
+                    </a:r>
+                    <a:r>
+                      <a:rPr lang="en-SG" sz="1700" i="1" dirty="0" err="1" smtClean="0"/>
+                      <a:t>CommandResult</a:t>
+                    </a:r>
+                    <a:endParaRPr lang="en-SG" sz="1700" i="1" dirty="0"/>
+                  </a:p>
+                </p:txBody>
+              </p:sp>
+            </p:grpSp>
+          </p:grpSp>
+        </p:grpSp>
+      </p:grpSp>
+    </p:spTree>
+    <p:extLst>
+      <p:ext uri="{BB962C8B-B14F-4D97-AF65-F5344CB8AC3E}">
+        <p14:creationId xmlns:p14="http://schemas.microsoft.com/office/powerpoint/2010/main" xmlns="" val="1577130838"/>
+      </p:ext>
+    </p:extLst>
+  </p:cSld>
+  <p:clrMapOvr>
+    <a:masterClrMapping/>
+  </p:clrMapOvr>
+</p:sld>
+</file>
+
+<file path=ppt/slides/slide6.xml><?xml version="1.0" encoding="utf-8"?>
 <p:sld xmlns:a="http://schemas.openxmlformats.org/drawingml/2006/main" xmlns:r="http://schemas.openxmlformats.org/officeDocument/2006/relationships" xmlns:p="http://schemas.openxmlformats.org/presentationml/2006/main">
   <p:cSld>
     <p:spTree>
@@ -8845,7 +10669,7 @@
               <a:blip r:embed="rId2" cstate="print">
                 <a:extLst>
                   <a:ext uri="{28A0092B-C50C-407E-A947-70E740481C1C}">
-                    <a14:useLocalDpi xmlns="" xmlns:a14="http://schemas.microsoft.com/office/drawing/2010/main" val="0"/>
+                    <a14:useLocalDpi xmlns:a14="http://schemas.microsoft.com/office/drawing/2010/main" xmlns="" val="0"/>
                   </a:ext>
                 </a:extLst>
               </a:blip>
@@ -8865,7 +10689,7 @@
               <a:noFill/>
               <a:extLst>
                 <a:ext uri="{909E8E84-426E-40DD-AFC4-6F175D3DCCD1}">
-                  <a14:hiddenFill xmlns="" xmlns:a14="http://schemas.microsoft.com/office/drawing/2010/main">
+                  <a14:hiddenFill xmlns:a14="http://schemas.microsoft.com/office/drawing/2010/main" xmlns="">
                     <a:solidFill>
                       <a:srgbClr val="FFFFFF"/>
                     </a:solidFill>
@@ -9209,7 +11033,7 @@
     </p:spTree>
     <p:extLst>
       <p:ext uri="{BB962C8B-B14F-4D97-AF65-F5344CB8AC3E}">
-        <p14:creationId xmlns="" xmlns:p14="http://schemas.microsoft.com/office/powerpoint/2010/main" val="1289237162"/>
+        <p14:creationId xmlns:p14="http://schemas.microsoft.com/office/powerpoint/2010/main" xmlns="" val="1289237162"/>
       </p:ext>
     </p:extLst>
   </p:cSld>
@@ -9219,7 +11043,7 @@
 </p:sld>
 </file>
 
-<file path=ppt/slides/slide6.xml><?xml version="1.0" encoding="utf-8"?>
+<file path=ppt/slides/slide7.xml><?xml version="1.0" encoding="utf-8"?>
 <p:sld xmlns:a="http://schemas.openxmlformats.org/drawingml/2006/main" xmlns:r="http://schemas.openxmlformats.org/officeDocument/2006/relationships" xmlns:p="http://schemas.openxmlformats.org/presentationml/2006/main">
   <p:cSld>
     <p:spTree>
@@ -10684,7 +12508,7 @@
     </p:spTree>
     <p:extLst>
       <p:ext uri="{BB962C8B-B14F-4D97-AF65-F5344CB8AC3E}">
-        <p14:creationId xmlns="" xmlns:p14="http://schemas.microsoft.com/office/powerpoint/2010/main" val="66083343"/>
+        <p14:creationId xmlns:p14="http://schemas.microsoft.com/office/powerpoint/2010/main" xmlns="" val="66083343"/>
       </p:ext>
     </p:extLst>
   </p:cSld>
@@ -10983,7 +12807,7 @@
   <a:extraClrSchemeLst/>
   <a:extLst>
     <a:ext uri="{05A4C25C-085E-4340-85A3-A5531E510DB2}">
-      <thm15:themeFamily xmlns="" xmlns:thm15="http://schemas.microsoft.com/office/thememl/2012/main" name="Office Theme" id="{62F939B6-93AF-4DB8-9C6B-D6C7DFDC589F}" vid="{4A3C46E8-61CC-4603-A589-7422A47A8E4A}"/>
+      <thm15:themeFamily xmlns:thm15="http://schemas.microsoft.com/office/thememl/2012/main" xmlns="" name="Office Theme" id="{62F939B6-93AF-4DB8-9C6B-D6C7DFDC589F}" vid="{4A3C46E8-61CC-4603-A589-7422A47A8E4A}"/>
     </a:ext>
   </a:extLst>
 </a:theme>

</xml_diff>

<commit_message>
Update dev guide 2
</commit_message>
<xml_diff>
--- a/doc/DeveloperGuide.pptx
+++ b/doc/DeveloperGuide.pptx
@@ -112,7 +112,7 @@
   </p:defaultTextStyle>
   <p:extLst>
     <p:ext uri="{EFAFB233-063F-42B5-8137-9DF3F51BA10A}">
-      <p15:sldGuideLst xmlns:p15="http://schemas.microsoft.com/office/powerpoint/2012/main" xmlns=""/>
+      <p15:sldGuideLst xmlns="" xmlns:p15="http://schemas.microsoft.com/office/powerpoint/2012/main"/>
     </p:ext>
   </p:extLst>
 </p:presentation>
@@ -250,7 +250,7 @@
             <a:fld id="{6A6D87FE-50F0-4561-88DF-C9C624F56716}" type="datetimeFigureOut">
               <a:rPr lang="en-SG" smtClean="0"/>
               <a:pPr/>
-              <a:t>27/10/2016</a:t>
+              <a:t>28/10/2016</a:t>
             </a:fld>
             <a:endParaRPr lang="en-SG"/>
           </a:p>
@@ -302,7 +302,7 @@
     </p:spTree>
     <p:extLst>
       <p:ext uri="{BB962C8B-B14F-4D97-AF65-F5344CB8AC3E}">
-        <p14:creationId xmlns:p14="http://schemas.microsoft.com/office/powerpoint/2010/main" xmlns="" val="885967701"/>
+        <p14:creationId xmlns="" xmlns:p14="http://schemas.microsoft.com/office/powerpoint/2010/main" val="885967701"/>
       </p:ext>
     </p:extLst>
   </p:cSld>
@@ -422,7 +422,7 @@
             <a:fld id="{6A6D87FE-50F0-4561-88DF-C9C624F56716}" type="datetimeFigureOut">
               <a:rPr lang="en-SG" smtClean="0"/>
               <a:pPr/>
-              <a:t>27/10/2016</a:t>
+              <a:t>28/10/2016</a:t>
             </a:fld>
             <a:endParaRPr lang="en-SG"/>
           </a:p>
@@ -474,7 +474,7 @@
     </p:spTree>
     <p:extLst>
       <p:ext uri="{BB962C8B-B14F-4D97-AF65-F5344CB8AC3E}">
-        <p14:creationId xmlns:p14="http://schemas.microsoft.com/office/powerpoint/2010/main" xmlns="" val="2514989070"/>
+        <p14:creationId xmlns="" xmlns:p14="http://schemas.microsoft.com/office/powerpoint/2010/main" val="2514989070"/>
       </p:ext>
     </p:extLst>
   </p:cSld>
@@ -604,7 +604,7 @@
             <a:fld id="{6A6D87FE-50F0-4561-88DF-C9C624F56716}" type="datetimeFigureOut">
               <a:rPr lang="en-SG" smtClean="0"/>
               <a:pPr/>
-              <a:t>27/10/2016</a:t>
+              <a:t>28/10/2016</a:t>
             </a:fld>
             <a:endParaRPr lang="en-SG"/>
           </a:p>
@@ -656,7 +656,7 @@
     </p:spTree>
     <p:extLst>
       <p:ext uri="{BB962C8B-B14F-4D97-AF65-F5344CB8AC3E}">
-        <p14:creationId xmlns:p14="http://schemas.microsoft.com/office/powerpoint/2010/main" xmlns="" val="1140117352"/>
+        <p14:creationId xmlns="" xmlns:p14="http://schemas.microsoft.com/office/powerpoint/2010/main" val="1140117352"/>
       </p:ext>
     </p:extLst>
   </p:cSld>
@@ -776,7 +776,7 @@
             <a:fld id="{6A6D87FE-50F0-4561-88DF-C9C624F56716}" type="datetimeFigureOut">
               <a:rPr lang="en-SG" smtClean="0"/>
               <a:pPr/>
-              <a:t>27/10/2016</a:t>
+              <a:t>28/10/2016</a:t>
             </a:fld>
             <a:endParaRPr lang="en-SG"/>
           </a:p>
@@ -828,7 +828,7 @@
     </p:spTree>
     <p:extLst>
       <p:ext uri="{BB962C8B-B14F-4D97-AF65-F5344CB8AC3E}">
-        <p14:creationId xmlns:p14="http://schemas.microsoft.com/office/powerpoint/2010/main" xmlns="" val="1305359399"/>
+        <p14:creationId xmlns="" xmlns:p14="http://schemas.microsoft.com/office/powerpoint/2010/main" val="1305359399"/>
       </p:ext>
     </p:extLst>
   </p:cSld>
@@ -1024,7 +1024,7 @@
             <a:fld id="{6A6D87FE-50F0-4561-88DF-C9C624F56716}" type="datetimeFigureOut">
               <a:rPr lang="en-SG" smtClean="0"/>
               <a:pPr/>
-              <a:t>27/10/2016</a:t>
+              <a:t>28/10/2016</a:t>
             </a:fld>
             <a:endParaRPr lang="en-SG"/>
           </a:p>
@@ -1076,7 +1076,7 @@
     </p:spTree>
     <p:extLst>
       <p:ext uri="{BB962C8B-B14F-4D97-AF65-F5344CB8AC3E}">
-        <p14:creationId xmlns:p14="http://schemas.microsoft.com/office/powerpoint/2010/main" xmlns="" val="1635507559"/>
+        <p14:creationId xmlns="" xmlns:p14="http://schemas.microsoft.com/office/powerpoint/2010/main" val="1635507559"/>
       </p:ext>
     </p:extLst>
   </p:cSld>
@@ -1258,7 +1258,7 @@
             <a:fld id="{6A6D87FE-50F0-4561-88DF-C9C624F56716}" type="datetimeFigureOut">
               <a:rPr lang="en-SG" smtClean="0"/>
               <a:pPr/>
-              <a:t>27/10/2016</a:t>
+              <a:t>28/10/2016</a:t>
             </a:fld>
             <a:endParaRPr lang="en-SG"/>
           </a:p>
@@ -1310,7 +1310,7 @@
     </p:spTree>
     <p:extLst>
       <p:ext uri="{BB962C8B-B14F-4D97-AF65-F5344CB8AC3E}">
-        <p14:creationId xmlns:p14="http://schemas.microsoft.com/office/powerpoint/2010/main" xmlns="" val="3880365593"/>
+        <p14:creationId xmlns="" xmlns:p14="http://schemas.microsoft.com/office/powerpoint/2010/main" val="3880365593"/>
       </p:ext>
     </p:extLst>
   </p:cSld>
@@ -1627,7 +1627,7 @@
             <a:fld id="{6A6D87FE-50F0-4561-88DF-C9C624F56716}" type="datetimeFigureOut">
               <a:rPr lang="en-SG" smtClean="0"/>
               <a:pPr/>
-              <a:t>27/10/2016</a:t>
+              <a:t>28/10/2016</a:t>
             </a:fld>
             <a:endParaRPr lang="en-SG"/>
           </a:p>
@@ -1679,7 +1679,7 @@
     </p:spTree>
     <p:extLst>
       <p:ext uri="{BB962C8B-B14F-4D97-AF65-F5344CB8AC3E}">
-        <p14:creationId xmlns:p14="http://schemas.microsoft.com/office/powerpoint/2010/main" xmlns="" val="761753800"/>
+        <p14:creationId xmlns="" xmlns:p14="http://schemas.microsoft.com/office/powerpoint/2010/main" val="761753800"/>
       </p:ext>
     </p:extLst>
   </p:cSld>
@@ -1747,7 +1747,7 @@
             <a:fld id="{6A6D87FE-50F0-4561-88DF-C9C624F56716}" type="datetimeFigureOut">
               <a:rPr lang="en-SG" smtClean="0"/>
               <a:pPr/>
-              <a:t>27/10/2016</a:t>
+              <a:t>28/10/2016</a:t>
             </a:fld>
             <a:endParaRPr lang="en-SG"/>
           </a:p>
@@ -1799,7 +1799,7 @@
     </p:spTree>
     <p:extLst>
       <p:ext uri="{BB962C8B-B14F-4D97-AF65-F5344CB8AC3E}">
-        <p14:creationId xmlns:p14="http://schemas.microsoft.com/office/powerpoint/2010/main" xmlns="" val="442809760"/>
+        <p14:creationId xmlns="" xmlns:p14="http://schemas.microsoft.com/office/powerpoint/2010/main" val="442809760"/>
       </p:ext>
     </p:extLst>
   </p:cSld>
@@ -1844,7 +1844,7 @@
             <a:fld id="{6A6D87FE-50F0-4561-88DF-C9C624F56716}" type="datetimeFigureOut">
               <a:rPr lang="en-SG" smtClean="0"/>
               <a:pPr/>
-              <a:t>27/10/2016</a:t>
+              <a:t>28/10/2016</a:t>
             </a:fld>
             <a:endParaRPr lang="en-SG"/>
           </a:p>
@@ -1896,7 +1896,7 @@
     </p:spTree>
     <p:extLst>
       <p:ext uri="{BB962C8B-B14F-4D97-AF65-F5344CB8AC3E}">
-        <p14:creationId xmlns:p14="http://schemas.microsoft.com/office/powerpoint/2010/main" xmlns="" val="3041616938"/>
+        <p14:creationId xmlns="" xmlns:p14="http://schemas.microsoft.com/office/powerpoint/2010/main" val="3041616938"/>
       </p:ext>
     </p:extLst>
   </p:cSld>
@@ -2123,7 +2123,7 @@
             <a:fld id="{6A6D87FE-50F0-4561-88DF-C9C624F56716}" type="datetimeFigureOut">
               <a:rPr lang="en-SG" smtClean="0"/>
               <a:pPr/>
-              <a:t>27/10/2016</a:t>
+              <a:t>28/10/2016</a:t>
             </a:fld>
             <a:endParaRPr lang="en-SG"/>
           </a:p>
@@ -2175,7 +2175,7 @@
     </p:spTree>
     <p:extLst>
       <p:ext uri="{BB962C8B-B14F-4D97-AF65-F5344CB8AC3E}">
-        <p14:creationId xmlns:p14="http://schemas.microsoft.com/office/powerpoint/2010/main" xmlns="" val="2367210547"/>
+        <p14:creationId xmlns="" xmlns:p14="http://schemas.microsoft.com/office/powerpoint/2010/main" val="2367210547"/>
       </p:ext>
     </p:extLst>
   </p:cSld>
@@ -2378,7 +2378,7 @@
             <a:fld id="{6A6D87FE-50F0-4561-88DF-C9C624F56716}" type="datetimeFigureOut">
               <a:rPr lang="en-SG" smtClean="0"/>
               <a:pPr/>
-              <a:t>27/10/2016</a:t>
+              <a:t>28/10/2016</a:t>
             </a:fld>
             <a:endParaRPr lang="en-SG"/>
           </a:p>
@@ -2430,7 +2430,7 @@
     </p:spTree>
     <p:extLst>
       <p:ext uri="{BB962C8B-B14F-4D97-AF65-F5344CB8AC3E}">
-        <p14:creationId xmlns:p14="http://schemas.microsoft.com/office/powerpoint/2010/main" xmlns="" val="5036302"/>
+        <p14:creationId xmlns="" xmlns:p14="http://schemas.microsoft.com/office/powerpoint/2010/main" val="5036302"/>
       </p:ext>
     </p:extLst>
   </p:cSld>
@@ -2593,7 +2593,7 @@
             <a:fld id="{6A6D87FE-50F0-4561-88DF-C9C624F56716}" type="datetimeFigureOut">
               <a:rPr lang="en-SG" smtClean="0"/>
               <a:pPr/>
-              <a:t>27/10/2016</a:t>
+              <a:t>28/10/2016</a:t>
             </a:fld>
             <a:endParaRPr lang="en-SG"/>
           </a:p>
@@ -2681,7 +2681,7 @@
     </p:spTree>
     <p:extLst>
       <p:ext uri="{BB962C8B-B14F-4D97-AF65-F5344CB8AC3E}">
-        <p14:creationId xmlns:p14="http://schemas.microsoft.com/office/powerpoint/2010/main" xmlns="" val="2495799563"/>
+        <p14:creationId xmlns="" xmlns:p14="http://schemas.microsoft.com/office/powerpoint/2010/main" val="2495799563"/>
       </p:ext>
     </p:extLst>
   </p:cSld>
@@ -3627,7 +3627,7 @@
     </p:spTree>
     <p:extLst>
       <p:ext uri="{BB962C8B-B14F-4D97-AF65-F5344CB8AC3E}">
-        <p14:creationId xmlns:p14="http://schemas.microsoft.com/office/powerpoint/2010/main" xmlns="" val="2395715797"/>
+        <p14:creationId xmlns="" xmlns:p14="http://schemas.microsoft.com/office/powerpoint/2010/main" val="2395715797"/>
       </p:ext>
     </p:extLst>
   </p:cSld>
@@ -3694,9 +3694,9 @@
         <p:grpSpPr>
           <a:xfrm>
             <a:off x="775378" y="1923068"/>
-            <a:ext cx="10631054" cy="3101419"/>
+            <a:ext cx="10631054" cy="3948343"/>
             <a:chOff x="775378" y="1923068"/>
-            <a:chExt cx="10631054" cy="3101419"/>
+            <a:chExt cx="10631054" cy="3948343"/>
           </a:xfrm>
         </p:grpSpPr>
         <p:sp>
@@ -3708,7 +3708,7 @@
           <p:spPr>
             <a:xfrm>
               <a:off x="3547887" y="1923068"/>
-              <a:ext cx="7858545" cy="3101419"/>
+              <a:ext cx="7858545" cy="3948343"/>
             </a:xfrm>
             <a:prstGeom prst="roundRect">
               <a:avLst/>
@@ -4388,8 +4388,8 @@
           </p:nvSpPr>
           <p:spPr>
             <a:xfrm>
-              <a:off x="3838279" y="3815811"/>
-              <a:ext cx="1414020" cy="841422"/>
+              <a:off x="3838278" y="3815811"/>
+              <a:ext cx="1773249" cy="841422"/>
             </a:xfrm>
             <a:prstGeom prst="rect">
               <a:avLst/>
@@ -4439,13 +4439,29 @@
             <a:p>
               <a:pPr algn="ctr"/>
               <a:r>
-                <a:rPr lang="en-SG" dirty="0">
+                <a:rPr lang="en-SG" dirty="0" smtClean="0">
                   <a:solidFill>
                     <a:schemeClr val="accent6"/>
                   </a:solidFill>
                 </a:rPr>
-                <a:t>Storage</a:t>
+                <a:t>&lt;&lt;Interface&gt;&gt;</a:t>
               </a:r>
+            </a:p>
+            <a:p>
+              <a:pPr algn="ctr"/>
+              <a:r>
+                <a:rPr lang="en-SG" dirty="0" err="1" smtClean="0">
+                  <a:solidFill>
+                    <a:schemeClr val="accent6"/>
+                  </a:solidFill>
+                </a:rPr>
+                <a:t>ScheduleStorage</a:t>
+              </a:r>
+              <a:endParaRPr lang="en-SG" dirty="0">
+                <a:solidFill>
+                  <a:schemeClr val="accent6"/>
+                </a:solidFill>
+              </a:endParaRPr>
             </a:p>
           </p:txBody>
         </p:sp>
@@ -4457,7 +4473,7 @@
           </p:nvSpPr>
           <p:spPr>
             <a:xfrm>
-              <a:off x="5806912" y="3815811"/>
+              <a:off x="6047537" y="3815811"/>
               <a:ext cx="2218447" cy="841422"/>
             </a:xfrm>
             <a:prstGeom prst="rect">
@@ -4506,8 +4522,8 @@
           </p:nvCxnSpPr>
           <p:spPr>
             <a:xfrm flipH="1">
-              <a:off x="5252299" y="4236522"/>
-              <a:ext cx="554613" cy="0"/>
+              <a:off x="5611527" y="4236522"/>
+              <a:ext cx="436010" cy="0"/>
             </a:xfrm>
             <a:prstGeom prst="straightConnector1">
               <a:avLst/>
@@ -4672,10 +4688,537 @@
           </p:txBody>
         </p:sp>
       </p:grpSp>
+      <p:sp>
+        <p:nvSpPr>
+          <p:cNvPr id="51" name="Rectangle 50"/>
+          <p:cNvSpPr/>
+          <p:nvPr/>
+        </p:nvSpPr>
+        <p:spPr>
+          <a:xfrm>
+            <a:off x="3825683" y="4899140"/>
+            <a:ext cx="1414020" cy="841422"/>
+          </a:xfrm>
+          <a:prstGeom prst="rect">
+            <a:avLst/>
+          </a:prstGeom>
+          <a:gradFill>
+            <a:gsLst>
+              <a:gs pos="8000">
+                <a:schemeClr val="accent6">
+                  <a:lumMod val="60000"/>
+                  <a:lumOff val="40000"/>
+                </a:schemeClr>
+              </a:gs>
+              <a:gs pos="100000">
+                <a:schemeClr val="accent6">
+                  <a:lumMod val="20000"/>
+                  <a:lumOff val="80000"/>
+                </a:schemeClr>
+              </a:gs>
+            </a:gsLst>
+            <a:lin ang="5400000" scaled="1"/>
+          </a:gradFill>
+          <a:ln w="12700">
+            <a:solidFill>
+              <a:schemeClr val="accent6">
+                <a:lumMod val="75000"/>
+              </a:schemeClr>
+            </a:solidFill>
+          </a:ln>
+        </p:spPr>
+        <p:style>
+          <a:lnRef idx="1">
+            <a:schemeClr val="accent6"/>
+          </a:lnRef>
+          <a:fillRef idx="2">
+            <a:schemeClr val="accent6"/>
+          </a:fillRef>
+          <a:effectRef idx="1">
+            <a:schemeClr val="accent6"/>
+          </a:effectRef>
+          <a:fontRef idx="minor">
+            <a:schemeClr val="dk1"/>
+          </a:fontRef>
+        </p:style>
+        <p:txBody>
+          <a:bodyPr rtlCol="0" anchor="ctr"/>
+          <a:lstStyle/>
+          <a:p>
+            <a:pPr algn="ctr"/>
+            <a:r>
+              <a:rPr lang="en-SG" dirty="0" smtClean="0">
+                <a:solidFill>
+                  <a:schemeClr val="accent6"/>
+                </a:solidFill>
+              </a:rPr>
+              <a:t>Adapted-Schedule</a:t>
+            </a:r>
+            <a:endParaRPr lang="en-SG" dirty="0">
+              <a:solidFill>
+                <a:schemeClr val="accent6"/>
+              </a:solidFill>
+            </a:endParaRPr>
+          </a:p>
+        </p:txBody>
+      </p:sp>
+      <p:cxnSp>
+        <p:nvCxnSpPr>
+          <p:cNvPr id="52" name="Straight Arrow Connector 51"/>
+          <p:cNvCxnSpPr/>
+          <p:nvPr/>
+        </p:nvCxnSpPr>
+        <p:spPr>
+          <a:xfrm>
+            <a:off x="5239703" y="5317534"/>
+            <a:ext cx="556182" cy="0"/>
+          </a:xfrm>
+          <a:prstGeom prst="straightConnector1">
+            <a:avLst/>
+          </a:prstGeom>
+          <a:ln w="19050">
+            <a:solidFill>
+              <a:schemeClr val="accent6"/>
+            </a:solidFill>
+            <a:headEnd type="none" w="med" len="med"/>
+            <a:tailEnd type="arrow" w="med" len="med"/>
+          </a:ln>
+        </p:spPr>
+        <p:style>
+          <a:lnRef idx="1">
+            <a:schemeClr val="accent1"/>
+          </a:lnRef>
+          <a:fillRef idx="0">
+            <a:schemeClr val="accent1"/>
+          </a:fillRef>
+          <a:effectRef idx="0">
+            <a:schemeClr val="accent1"/>
+          </a:effectRef>
+          <a:fontRef idx="minor">
+            <a:schemeClr val="tx1"/>
+          </a:fontRef>
+        </p:style>
+      </p:cxnSp>
+      <p:sp>
+        <p:nvSpPr>
+          <p:cNvPr id="53" name="Rectangle 52"/>
+          <p:cNvSpPr/>
+          <p:nvPr/>
+        </p:nvSpPr>
+        <p:spPr>
+          <a:xfrm>
+            <a:off x="5805312" y="4896823"/>
+            <a:ext cx="1414020" cy="841422"/>
+          </a:xfrm>
+          <a:prstGeom prst="rect">
+            <a:avLst/>
+          </a:prstGeom>
+          <a:gradFill>
+            <a:gsLst>
+              <a:gs pos="8000">
+                <a:schemeClr val="accent6">
+                  <a:lumMod val="60000"/>
+                  <a:lumOff val="40000"/>
+                </a:schemeClr>
+              </a:gs>
+              <a:gs pos="100000">
+                <a:schemeClr val="accent6">
+                  <a:lumMod val="20000"/>
+                  <a:lumOff val="80000"/>
+                </a:schemeClr>
+              </a:gs>
+            </a:gsLst>
+            <a:lin ang="5400000" scaled="1"/>
+          </a:gradFill>
+          <a:ln w="12700">
+            <a:solidFill>
+              <a:schemeClr val="accent6">
+                <a:lumMod val="75000"/>
+              </a:schemeClr>
+            </a:solidFill>
+          </a:ln>
+        </p:spPr>
+        <p:style>
+          <a:lnRef idx="1">
+            <a:schemeClr val="accent6"/>
+          </a:lnRef>
+          <a:fillRef idx="2">
+            <a:schemeClr val="accent6"/>
+          </a:fillRef>
+          <a:effectRef idx="1">
+            <a:schemeClr val="accent6"/>
+          </a:effectRef>
+          <a:fontRef idx="minor">
+            <a:schemeClr val="dk1"/>
+          </a:fontRef>
+        </p:style>
+        <p:txBody>
+          <a:bodyPr rtlCol="0" anchor="ctr"/>
+          <a:lstStyle/>
+          <a:p>
+            <a:pPr algn="ctr"/>
+            <a:r>
+              <a:rPr lang="en-SG" dirty="0" smtClean="0">
+                <a:solidFill>
+                  <a:schemeClr val="accent6"/>
+                </a:solidFill>
+              </a:rPr>
+              <a:t>Adapted-State</a:t>
+            </a:r>
+            <a:endParaRPr lang="en-SG" dirty="0">
+              <a:solidFill>
+                <a:schemeClr val="accent6"/>
+              </a:solidFill>
+            </a:endParaRPr>
+          </a:p>
+        </p:txBody>
+      </p:sp>
+      <p:sp>
+        <p:nvSpPr>
+          <p:cNvPr id="54" name="Diamond 53"/>
+          <p:cNvSpPr/>
+          <p:nvPr/>
+        </p:nvSpPr>
+        <p:spPr>
+          <a:xfrm>
+            <a:off x="5249130" y="5223266"/>
+            <a:ext cx="311084" cy="188536"/>
+          </a:xfrm>
+          <a:prstGeom prst="diamond">
+            <a:avLst/>
+          </a:prstGeom>
+        </p:spPr>
+        <p:style>
+          <a:lnRef idx="2">
+            <a:schemeClr val="accent6">
+              <a:shade val="50000"/>
+            </a:schemeClr>
+          </a:lnRef>
+          <a:fillRef idx="1">
+            <a:schemeClr val="accent6"/>
+          </a:fillRef>
+          <a:effectRef idx="0">
+            <a:schemeClr val="accent6"/>
+          </a:effectRef>
+          <a:fontRef idx="minor">
+            <a:schemeClr val="lt1"/>
+          </a:fontRef>
+        </p:style>
+        <p:txBody>
+          <a:bodyPr rtlCol="0" anchor="ctr"/>
+          <a:lstStyle/>
+          <a:p>
+            <a:pPr algn="ctr"/>
+            <a:endParaRPr lang="en-SG"/>
+          </a:p>
+        </p:txBody>
+      </p:sp>
+      <p:cxnSp>
+        <p:nvCxnSpPr>
+          <p:cNvPr id="55" name="Straight Arrow Connector 54"/>
+          <p:cNvCxnSpPr/>
+          <p:nvPr/>
+        </p:nvCxnSpPr>
+        <p:spPr>
+          <a:xfrm>
+            <a:off x="7230324" y="5319104"/>
+            <a:ext cx="556182" cy="0"/>
+          </a:xfrm>
+          <a:prstGeom prst="straightConnector1">
+            <a:avLst/>
+          </a:prstGeom>
+          <a:ln w="19050">
+            <a:solidFill>
+              <a:schemeClr val="accent6"/>
+            </a:solidFill>
+            <a:headEnd type="none" w="med" len="med"/>
+            <a:tailEnd type="arrow" w="med" len="med"/>
+          </a:ln>
+        </p:spPr>
+        <p:style>
+          <a:lnRef idx="1">
+            <a:schemeClr val="accent1"/>
+          </a:lnRef>
+          <a:fillRef idx="0">
+            <a:schemeClr val="accent1"/>
+          </a:fillRef>
+          <a:effectRef idx="0">
+            <a:schemeClr val="accent1"/>
+          </a:effectRef>
+          <a:fontRef idx="minor">
+            <a:schemeClr val="tx1"/>
+          </a:fontRef>
+        </p:style>
+      </p:cxnSp>
+      <p:sp>
+        <p:nvSpPr>
+          <p:cNvPr id="56" name="Rectangle 55"/>
+          <p:cNvSpPr/>
+          <p:nvPr/>
+        </p:nvSpPr>
+        <p:spPr>
+          <a:xfrm>
+            <a:off x="7795933" y="4898393"/>
+            <a:ext cx="1414020" cy="841422"/>
+          </a:xfrm>
+          <a:prstGeom prst="rect">
+            <a:avLst/>
+          </a:prstGeom>
+          <a:gradFill>
+            <a:gsLst>
+              <a:gs pos="8000">
+                <a:schemeClr val="accent6">
+                  <a:lumMod val="60000"/>
+                  <a:lumOff val="40000"/>
+                </a:schemeClr>
+              </a:gs>
+              <a:gs pos="100000">
+                <a:schemeClr val="accent6">
+                  <a:lumMod val="20000"/>
+                  <a:lumOff val="80000"/>
+                </a:schemeClr>
+              </a:gs>
+            </a:gsLst>
+            <a:lin ang="5400000" scaled="1"/>
+          </a:gradFill>
+          <a:ln w="12700">
+            <a:solidFill>
+              <a:schemeClr val="accent6">
+                <a:lumMod val="75000"/>
+              </a:schemeClr>
+            </a:solidFill>
+          </a:ln>
+        </p:spPr>
+        <p:style>
+          <a:lnRef idx="1">
+            <a:schemeClr val="accent6"/>
+          </a:lnRef>
+          <a:fillRef idx="2">
+            <a:schemeClr val="accent6"/>
+          </a:fillRef>
+          <a:effectRef idx="1">
+            <a:schemeClr val="accent6"/>
+          </a:effectRef>
+          <a:fontRef idx="minor">
+            <a:schemeClr val="dk1"/>
+          </a:fontRef>
+        </p:style>
+        <p:txBody>
+          <a:bodyPr rtlCol="0" anchor="ctr"/>
+          <a:lstStyle/>
+          <a:p>
+            <a:pPr algn="ctr"/>
+            <a:r>
+              <a:rPr lang="en-SG" dirty="0" smtClean="0">
+                <a:solidFill>
+                  <a:schemeClr val="accent6"/>
+                </a:solidFill>
+              </a:rPr>
+              <a:t>Adapted-Task</a:t>
+            </a:r>
+            <a:endParaRPr lang="en-SG" dirty="0">
+              <a:solidFill>
+                <a:schemeClr val="accent6"/>
+              </a:solidFill>
+            </a:endParaRPr>
+          </a:p>
+        </p:txBody>
+      </p:sp>
+      <p:sp>
+        <p:nvSpPr>
+          <p:cNvPr id="57" name="Diamond 56"/>
+          <p:cNvSpPr/>
+          <p:nvPr/>
+        </p:nvSpPr>
+        <p:spPr>
+          <a:xfrm>
+            <a:off x="7239751" y="5224836"/>
+            <a:ext cx="311084" cy="188536"/>
+          </a:xfrm>
+          <a:prstGeom prst="diamond">
+            <a:avLst/>
+          </a:prstGeom>
+        </p:spPr>
+        <p:style>
+          <a:lnRef idx="2">
+            <a:schemeClr val="accent6">
+              <a:shade val="50000"/>
+            </a:schemeClr>
+          </a:lnRef>
+          <a:fillRef idx="1">
+            <a:schemeClr val="accent6"/>
+          </a:fillRef>
+          <a:effectRef idx="0">
+            <a:schemeClr val="accent6"/>
+          </a:effectRef>
+          <a:fontRef idx="minor">
+            <a:schemeClr val="lt1"/>
+          </a:fontRef>
+        </p:style>
+        <p:txBody>
+          <a:bodyPr rtlCol="0" anchor="ctr"/>
+          <a:lstStyle/>
+          <a:p>
+            <a:pPr algn="ctr"/>
+            <a:endParaRPr lang="en-SG"/>
+          </a:p>
+        </p:txBody>
+      </p:sp>
+      <p:cxnSp>
+        <p:nvCxnSpPr>
+          <p:cNvPr id="58" name="Straight Arrow Connector 57"/>
+          <p:cNvCxnSpPr/>
+          <p:nvPr/>
+        </p:nvCxnSpPr>
+        <p:spPr>
+          <a:xfrm>
+            <a:off x="9191103" y="5319102"/>
+            <a:ext cx="556182" cy="0"/>
+          </a:xfrm>
+          <a:prstGeom prst="straightConnector1">
+            <a:avLst/>
+          </a:prstGeom>
+          <a:ln w="19050">
+            <a:solidFill>
+              <a:schemeClr val="accent6"/>
+            </a:solidFill>
+            <a:headEnd type="none" w="med" len="med"/>
+            <a:tailEnd type="arrow" w="med" len="med"/>
+          </a:ln>
+        </p:spPr>
+        <p:style>
+          <a:lnRef idx="1">
+            <a:schemeClr val="accent1"/>
+          </a:lnRef>
+          <a:fillRef idx="0">
+            <a:schemeClr val="accent1"/>
+          </a:fillRef>
+          <a:effectRef idx="0">
+            <a:schemeClr val="accent1"/>
+          </a:effectRef>
+          <a:fontRef idx="minor">
+            <a:schemeClr val="tx1"/>
+          </a:fontRef>
+        </p:style>
+      </p:cxnSp>
+      <p:sp>
+        <p:nvSpPr>
+          <p:cNvPr id="59" name="Rectangle 58"/>
+          <p:cNvSpPr/>
+          <p:nvPr/>
+        </p:nvSpPr>
+        <p:spPr>
+          <a:xfrm>
+            <a:off x="9756712" y="4898391"/>
+            <a:ext cx="1414020" cy="841422"/>
+          </a:xfrm>
+          <a:prstGeom prst="rect">
+            <a:avLst/>
+          </a:prstGeom>
+          <a:gradFill>
+            <a:gsLst>
+              <a:gs pos="8000">
+                <a:schemeClr val="accent6">
+                  <a:lumMod val="60000"/>
+                  <a:lumOff val="40000"/>
+                </a:schemeClr>
+              </a:gs>
+              <a:gs pos="100000">
+                <a:schemeClr val="accent6">
+                  <a:lumMod val="20000"/>
+                  <a:lumOff val="80000"/>
+                </a:schemeClr>
+              </a:gs>
+            </a:gsLst>
+            <a:lin ang="5400000" scaled="1"/>
+          </a:gradFill>
+          <a:ln w="12700">
+            <a:solidFill>
+              <a:schemeClr val="accent6">
+                <a:lumMod val="75000"/>
+              </a:schemeClr>
+            </a:solidFill>
+          </a:ln>
+        </p:spPr>
+        <p:style>
+          <a:lnRef idx="1">
+            <a:schemeClr val="accent6"/>
+          </a:lnRef>
+          <a:fillRef idx="2">
+            <a:schemeClr val="accent6"/>
+          </a:fillRef>
+          <a:effectRef idx="1">
+            <a:schemeClr val="accent6"/>
+          </a:effectRef>
+          <a:fontRef idx="minor">
+            <a:schemeClr val="dk1"/>
+          </a:fontRef>
+        </p:style>
+        <p:txBody>
+          <a:bodyPr rtlCol="0" anchor="ctr"/>
+          <a:lstStyle/>
+          <a:p>
+            <a:pPr algn="ctr"/>
+            <a:r>
+              <a:rPr lang="en-SG" dirty="0" smtClean="0">
+                <a:solidFill>
+                  <a:schemeClr val="accent6"/>
+                </a:solidFill>
+              </a:rPr>
+              <a:t>Adapted-Reminder</a:t>
+            </a:r>
+            <a:endParaRPr lang="en-SG" dirty="0">
+              <a:solidFill>
+                <a:schemeClr val="accent6"/>
+              </a:solidFill>
+            </a:endParaRPr>
+          </a:p>
+        </p:txBody>
+      </p:sp>
+      <p:sp>
+        <p:nvSpPr>
+          <p:cNvPr id="60" name="Diamond 59"/>
+          <p:cNvSpPr/>
+          <p:nvPr/>
+        </p:nvSpPr>
+        <p:spPr>
+          <a:xfrm>
+            <a:off x="9200530" y="5224834"/>
+            <a:ext cx="311084" cy="188536"/>
+          </a:xfrm>
+          <a:prstGeom prst="diamond">
+            <a:avLst/>
+          </a:prstGeom>
+        </p:spPr>
+        <p:style>
+          <a:lnRef idx="2">
+            <a:schemeClr val="accent6">
+              <a:shade val="50000"/>
+            </a:schemeClr>
+          </a:lnRef>
+          <a:fillRef idx="1">
+            <a:schemeClr val="accent6"/>
+          </a:fillRef>
+          <a:effectRef idx="0">
+            <a:schemeClr val="accent6"/>
+          </a:effectRef>
+          <a:fontRef idx="minor">
+            <a:schemeClr val="lt1"/>
+          </a:fontRef>
+        </p:style>
+        <p:txBody>
+          <a:bodyPr rtlCol="0" anchor="ctr"/>
+          <a:lstStyle/>
+          <a:p>
+            <a:pPr algn="ctr"/>
+            <a:endParaRPr lang="en-SG"/>
+          </a:p>
+        </p:txBody>
+      </p:sp>
     </p:spTree>
     <p:extLst>
       <p:ext uri="{BB962C8B-B14F-4D97-AF65-F5344CB8AC3E}">
-        <p14:creationId xmlns:p14="http://schemas.microsoft.com/office/powerpoint/2010/main" xmlns="" val="865566284"/>
+        <p14:creationId xmlns="" xmlns:p14="http://schemas.microsoft.com/office/powerpoint/2010/main" val="865566284"/>
       </p:ext>
     </p:extLst>
   </p:cSld>
@@ -6372,7 +6915,7 @@
     </p:spTree>
     <p:extLst>
       <p:ext uri="{BB962C8B-B14F-4D97-AF65-F5344CB8AC3E}">
-        <p14:creationId xmlns:p14="http://schemas.microsoft.com/office/powerpoint/2010/main" xmlns="" val="144807405"/>
+        <p14:creationId xmlns="" xmlns:p14="http://schemas.microsoft.com/office/powerpoint/2010/main" val="144807405"/>
       </p:ext>
     </p:extLst>
   </p:cSld>
@@ -8245,7 +8788,7 @@
     </p:spTree>
     <p:extLst>
       <p:ext uri="{BB962C8B-B14F-4D97-AF65-F5344CB8AC3E}">
-        <p14:creationId xmlns:p14="http://schemas.microsoft.com/office/powerpoint/2010/main" xmlns="" val="1577130838"/>
+        <p14:creationId xmlns="" xmlns:p14="http://schemas.microsoft.com/office/powerpoint/2010/main" val="1577130838"/>
       </p:ext>
     </p:extLst>
   </p:cSld>
@@ -10044,7 +10587,7 @@
     </p:spTree>
     <p:extLst>
       <p:ext uri="{BB962C8B-B14F-4D97-AF65-F5344CB8AC3E}">
-        <p14:creationId xmlns:p14="http://schemas.microsoft.com/office/powerpoint/2010/main" xmlns="" val="1577130838"/>
+        <p14:creationId xmlns="" xmlns:p14="http://schemas.microsoft.com/office/powerpoint/2010/main" val="1577130838"/>
       </p:ext>
     </p:extLst>
   </p:cSld>
@@ -10669,7 +11212,7 @@
               <a:blip r:embed="rId2" cstate="print">
                 <a:extLst>
                   <a:ext uri="{28A0092B-C50C-407E-A947-70E740481C1C}">
-                    <a14:useLocalDpi xmlns:a14="http://schemas.microsoft.com/office/drawing/2010/main" xmlns="" val="0"/>
+                    <a14:useLocalDpi xmlns="" xmlns:a14="http://schemas.microsoft.com/office/drawing/2010/main" val="0"/>
                   </a:ext>
                 </a:extLst>
               </a:blip>
@@ -10689,7 +11232,7 @@
               <a:noFill/>
               <a:extLst>
                 <a:ext uri="{909E8E84-426E-40DD-AFC4-6F175D3DCCD1}">
-                  <a14:hiddenFill xmlns:a14="http://schemas.microsoft.com/office/drawing/2010/main" xmlns="">
+                  <a14:hiddenFill xmlns="" xmlns:a14="http://schemas.microsoft.com/office/drawing/2010/main">
                     <a:solidFill>
                       <a:srgbClr val="FFFFFF"/>
                     </a:solidFill>
@@ -11033,7 +11576,7 @@
     </p:spTree>
     <p:extLst>
       <p:ext uri="{BB962C8B-B14F-4D97-AF65-F5344CB8AC3E}">
-        <p14:creationId xmlns:p14="http://schemas.microsoft.com/office/powerpoint/2010/main" xmlns="" val="1289237162"/>
+        <p14:creationId xmlns="" xmlns:p14="http://schemas.microsoft.com/office/powerpoint/2010/main" val="1289237162"/>
       </p:ext>
     </p:extLst>
   </p:cSld>
@@ -12508,7 +13051,7 @@
     </p:spTree>
     <p:extLst>
       <p:ext uri="{BB962C8B-B14F-4D97-AF65-F5344CB8AC3E}">
-        <p14:creationId xmlns:p14="http://schemas.microsoft.com/office/powerpoint/2010/main" xmlns="" val="66083343"/>
+        <p14:creationId xmlns="" xmlns:p14="http://schemas.microsoft.com/office/powerpoint/2010/main" val="66083343"/>
       </p:ext>
     </p:extLst>
   </p:cSld>
@@ -12807,7 +13350,7 @@
   <a:extraClrSchemeLst/>
   <a:extLst>
     <a:ext uri="{05A4C25C-085E-4340-85A3-A5531E510DB2}">
-      <thm15:themeFamily xmlns:thm15="http://schemas.microsoft.com/office/thememl/2012/main" xmlns="" name="Office Theme" id="{62F939B6-93AF-4DB8-9C6B-D6C7DFDC589F}" vid="{4A3C46E8-61CC-4603-A589-7422A47A8E4A}"/>
+      <thm15:themeFamily xmlns="" xmlns:thm15="http://schemas.microsoft.com/office/thememl/2012/main" name="Office Theme" id="{62F939B6-93AF-4DB8-9C6B-D6C7DFDC589F}" vid="{4A3C46E8-61CC-4603-A589-7422A47A8E4A}"/>
     </a:ext>
   </a:extLst>
 </a:theme>

</xml_diff>